<commit_message>
Added buddy implementation slides and fixed mem ones
</commit_message>
<xml_diff>
--- a/MentOS - Gestione Della Memoria.pptx
+++ b/MentOS - Gestione Della Memoria.pptx
@@ -171,6 +171,7 @@
 <p1510:revInfo xmlns:a="http://schemas.openxmlformats.org/drawingml/2006/main" xmlns:r="http://schemas.openxmlformats.org/officeDocument/2006/relationships" xmlns:p1510="http://schemas.microsoft.com/office/powerpoint/2015/10/main">
   <p1510:revLst>
     <p1510:client id="{6C867015-ACFB-4507-89DD-5908B80B4EF4}" v="1282" dt="2023-08-20T16:05:02.440"/>
+    <p1510:client id="{85C23748-025E-4ACB-BEC9-8480B520A30E}" v="6" dt="2023-08-21T14:34:57.297"/>
   </p1510:revLst>
 </p1510:revInfo>
 </file>
@@ -3442,7 +3443,7 @@
           </a:lstStyle>
           <a:p>
             <a:fld id="{D8E60CDC-4657-47C7-A0F1-D212428B02E1}" type="datetimeFigureOut">
-              <a:t>20/08/2023</a:t>
+              <a:t>21/08/2023</a:t>
             </a:fld>
             <a:endParaRPr lang="it-IT"/>
           </a:p>
@@ -3773,7 +3774,7 @@
           <a:p>
             <a:fld id="{9DE85E5F-4810-48A4-BB48-64D5F821BD7F}" type="slidenum">
               <a:rPr lang="it-IT" smtClean="0"/>
-              <a:t>2</a:t>
+              <a:t>1</a:t>
             </a:fld>
             <a:endParaRPr lang="it-IT"/>
           </a:p>
@@ -3857,7 +3858,7 @@
           <a:p>
             <a:fld id="{1317C824-2132-4BB7-8F95-0CAE4412AE81}" type="slidenum">
               <a:rPr lang="it-IT" noProof="0" smtClean="0"/>
-              <a:t>2</a:t>
+              <a:t>53</a:t>
             </a:fld>
             <a:endParaRPr lang="it-IT" noProof="0"/>
           </a:p>
@@ -4120,7 +4121,7 @@
             <a:fld id="{B61BEF0D-F0BB-DE4B-95CE-6DB70DBA9567}" type="datetimeFigureOut">
               <a:rPr lang="en-US" dirty="0"/>
               <a:pPr/>
-              <a:t>8/20/2023</a:t>
+              <a:t>8/21/2023</a:t>
             </a:fld>
             <a:endParaRPr lang="en-US" dirty="0"/>
           </a:p>
@@ -4382,7 +4383,7 @@
             <a:fld id="{B61BEF0D-F0BB-DE4B-95CE-6DB70DBA9567}" type="datetimeFigureOut">
               <a:rPr lang="en-US" dirty="0"/>
               <a:pPr/>
-              <a:t>8/20/2023</a:t>
+              <a:t>8/21/2023</a:t>
             </a:fld>
             <a:endParaRPr lang="en-US" dirty="0"/>
           </a:p>
@@ -4617,7 +4618,7 @@
             <a:fld id="{B61BEF0D-F0BB-DE4B-95CE-6DB70DBA9567}" type="datetimeFigureOut">
               <a:rPr lang="en-US" dirty="0"/>
               <a:pPr/>
-              <a:t>8/20/2023</a:t>
+              <a:t>8/21/2023</a:t>
             </a:fld>
             <a:endParaRPr lang="en-US" dirty="0"/>
           </a:p>
@@ -4857,7 +4858,7 @@
             <a:fld id="{B61BEF0D-F0BB-DE4B-95CE-6DB70DBA9567}" type="datetimeFigureOut">
               <a:rPr lang="en-US" dirty="0"/>
               <a:pPr/>
-              <a:t>8/20/2023</a:t>
+              <a:t>8/21/2023</a:t>
             </a:fld>
             <a:endParaRPr lang="en-US" dirty="0"/>
           </a:p>
@@ -5165,7 +5166,7 @@
             <a:fld id="{B61BEF0D-F0BB-DE4B-95CE-6DB70DBA9567}" type="datetimeFigureOut">
               <a:rPr lang="en-US" dirty="0"/>
               <a:pPr/>
-              <a:t>8/20/2023</a:t>
+              <a:t>8/21/2023</a:t>
             </a:fld>
             <a:endParaRPr lang="en-US" dirty="0"/>
           </a:p>
@@ -5466,7 +5467,7 @@
             <a:fld id="{B61BEF0D-F0BB-DE4B-95CE-6DB70DBA9567}" type="datetimeFigureOut">
               <a:rPr lang="en-US" dirty="0"/>
               <a:pPr/>
-              <a:t>8/20/2023</a:t>
+              <a:t>8/21/2023</a:t>
             </a:fld>
             <a:endParaRPr lang="en-US" dirty="0"/>
           </a:p>
@@ -5887,7 +5888,7 @@
             <a:fld id="{B61BEF0D-F0BB-DE4B-95CE-6DB70DBA9567}" type="datetimeFigureOut">
               <a:rPr lang="en-US" dirty="0"/>
               <a:pPr/>
-              <a:t>8/20/2023</a:t>
+              <a:t>8/21/2023</a:t>
             </a:fld>
             <a:endParaRPr lang="en-US" dirty="0"/>
           </a:p>
@@ -6050,7 +6051,7 @@
             <a:fld id="{B61BEF0D-F0BB-DE4B-95CE-6DB70DBA9567}" type="datetimeFigureOut">
               <a:rPr lang="en-US" dirty="0"/>
               <a:pPr/>
-              <a:t>8/20/2023</a:t>
+              <a:t>8/21/2023</a:t>
             </a:fld>
             <a:endParaRPr lang="en-US" dirty="0"/>
           </a:p>
@@ -6147,7 +6148,7 @@
             <a:fld id="{B61BEF0D-F0BB-DE4B-95CE-6DB70DBA9567}" type="datetimeFigureOut">
               <a:rPr lang="en-US" dirty="0"/>
               <a:pPr/>
-              <a:t>8/20/2023</a:t>
+              <a:t>8/21/2023</a:t>
             </a:fld>
             <a:endParaRPr lang="en-US" dirty="0"/>
           </a:p>
@@ -6525,7 +6526,7 @@
             <a:fld id="{B61BEF0D-F0BB-DE4B-95CE-6DB70DBA9567}" type="datetimeFigureOut">
               <a:rPr lang="en-US" dirty="0"/>
               <a:pPr/>
-              <a:t>8/20/2023</a:t>
+              <a:t>8/21/2023</a:t>
             </a:fld>
             <a:endParaRPr lang="en-US" dirty="0"/>
           </a:p>
@@ -6811,7 +6812,7 @@
             <a:fld id="{B61BEF0D-F0BB-DE4B-95CE-6DB70DBA9567}" type="datetimeFigureOut">
               <a:rPr lang="en-US" dirty="0"/>
               <a:pPr/>
-              <a:t>8/20/2023</a:t>
+              <a:t>8/21/2023</a:t>
             </a:fld>
             <a:endParaRPr lang="en-US" dirty="0"/>
           </a:p>
@@ -7050,7 +7051,7 @@
             <a:fld id="{B61BEF0D-F0BB-DE4B-95CE-6DB70DBA9567}" type="datetimeFigureOut">
               <a:rPr lang="en-US" dirty="0"/>
               <a:pPr/>
-              <a:t>8/20/2023</a:t>
+              <a:t>8/21/2023</a:t>
             </a:fld>
             <a:endParaRPr lang="en-US" dirty="0"/>
           </a:p>
@@ -11600,21 +11601,7 @@
                 <a:ea typeface="+mn-lt"/>
                 <a:cs typeface="+mn-lt"/>
               </a:rPr>
-              <a:t> tutti i frame liberi sono </a:t>
-            </a:r>
-            <a:r>
-              <a:rPr lang="it-IT" sz="2400" u="sng" dirty="0">
-                <a:ea typeface="+mn-lt"/>
-                <a:cs typeface="+mn-lt"/>
-              </a:rPr>
-              <a:t>raggruppati</a:t>
-            </a:r>
-            <a:r>
-              <a:rPr lang="it-IT" sz="2400" dirty="0">
-                <a:ea typeface="+mn-lt"/>
-                <a:cs typeface="+mn-lt"/>
-              </a:rPr>
-              <a:t> in 11 liste, ce contengono rispettivamente blocchi di 1, 2, 4, 8, 16, 32, 64, 128, 256, 512, e 1024 frame contigui.</a:t>
+              <a:t> tutti i frame liberi sono raggruppati in 11 liste, ce contengono rispettivamente blocchi di 1, 2, 4, 8, 16, 32, 64, 128, 256, 512, e 1024 frame contigui.</a:t>
             </a:r>
             <a:endParaRPr lang="it-IT" sz="2400" dirty="0"/>
           </a:p>
@@ -11988,7 +11975,7 @@
               <a:t>Separare il blocco a metà ricorsivamente finché non si ottiene la minima potenza di due in grado di soddisfare la richiesta. Ogni divisione genera due metà, quella su cui si ricorre ed un'altra (il </a:t>
             </a:r>
             <a:r>
-              <a:rPr lang="it-IT" sz="2400" i="1" u="sng" err="1">
+              <a:rPr lang="it-IT" sz="2400" i="1" err="1">
                 <a:ea typeface="+mn-lt"/>
                 <a:cs typeface="+mn-lt"/>
               </a:rPr>

</xml_diff>

<commit_message>
Correzione errori presenti nelle presentazioni
</commit_message>
<xml_diff>
--- a/MentOS - Gestione Della Memoria.pptx
+++ b/MentOS - Gestione Della Memoria.pptx
@@ -1008,7 +1008,7 @@
               <a:latin typeface="Calibri"/>
               <a:ea typeface="Calibri"/>
               <a:cs typeface="Calibri"/>
-              <a:hlinkClick xmlns:r="http://schemas.openxmlformats.org/officeDocument/2006/relationships" r:id=""/>
+              <a:hlinkClick xmlns:r="http://schemas.openxmlformats.org/officeDocument/2006/relationships" r:id="" action="ppaction://noaction"/>
             </a:rPr>
             <a:t>https://mentos-team.github.io/doc/doxygen/index.html</a:t>
           </a:r>
@@ -1751,7 +1751,7 @@
               <a:latin typeface="Calibri"/>
               <a:ea typeface="Calibri"/>
               <a:cs typeface="Calibri"/>
-              <a:hlinkClick xmlns:r="http://schemas.openxmlformats.org/officeDocument/2006/relationships" r:id=""/>
+              <a:hlinkClick xmlns:r="http://schemas.openxmlformats.org/officeDocument/2006/relationships" r:id="" action="ppaction://noaction"/>
             </a:rPr>
             <a:t>https://mentos-team.github.io/doc/doxygen/index.html</a:t>
           </a:r>
@@ -3518,7 +3518,7 @@
           </a:lstStyle>
           <a:p>
             <a:fld id="{D8E60CDC-4657-47C7-A0F1-D212428B02E1}" type="datetimeFigureOut">
-              <a:t>25/08/2023</a:t>
+              <a:t>29/08/2023</a:t>
             </a:fld>
             <a:endParaRPr lang="it-IT"/>
           </a:p>
@@ -4196,7 +4196,7 @@
             <a:fld id="{B61BEF0D-F0BB-DE4B-95CE-6DB70DBA9567}" type="datetimeFigureOut">
               <a:rPr lang="en-US" dirty="0"/>
               <a:pPr/>
-              <a:t>8/25/2023</a:t>
+              <a:t>8/29/2023</a:t>
             </a:fld>
             <a:endParaRPr lang="en-US" dirty="0"/>
           </a:p>
@@ -4458,7 +4458,7 @@
             <a:fld id="{B61BEF0D-F0BB-DE4B-95CE-6DB70DBA9567}" type="datetimeFigureOut">
               <a:rPr lang="en-US" dirty="0"/>
               <a:pPr/>
-              <a:t>8/25/2023</a:t>
+              <a:t>8/29/2023</a:t>
             </a:fld>
             <a:endParaRPr lang="en-US" dirty="0"/>
           </a:p>
@@ -4693,7 +4693,7 @@
             <a:fld id="{B61BEF0D-F0BB-DE4B-95CE-6DB70DBA9567}" type="datetimeFigureOut">
               <a:rPr lang="en-US" dirty="0"/>
               <a:pPr/>
-              <a:t>8/25/2023</a:t>
+              <a:t>8/29/2023</a:t>
             </a:fld>
             <a:endParaRPr lang="en-US" dirty="0"/>
           </a:p>
@@ -4933,7 +4933,7 @@
             <a:fld id="{B61BEF0D-F0BB-DE4B-95CE-6DB70DBA9567}" type="datetimeFigureOut">
               <a:rPr lang="en-US" dirty="0"/>
               <a:pPr/>
-              <a:t>8/25/2023</a:t>
+              <a:t>8/29/2023</a:t>
             </a:fld>
             <a:endParaRPr lang="en-US" dirty="0"/>
           </a:p>
@@ -5241,7 +5241,7 @@
             <a:fld id="{B61BEF0D-F0BB-DE4B-95CE-6DB70DBA9567}" type="datetimeFigureOut">
               <a:rPr lang="en-US" dirty="0"/>
               <a:pPr/>
-              <a:t>8/25/2023</a:t>
+              <a:t>8/29/2023</a:t>
             </a:fld>
             <a:endParaRPr lang="en-US" dirty="0"/>
           </a:p>
@@ -5542,7 +5542,7 @@
             <a:fld id="{B61BEF0D-F0BB-DE4B-95CE-6DB70DBA9567}" type="datetimeFigureOut">
               <a:rPr lang="en-US" dirty="0"/>
               <a:pPr/>
-              <a:t>8/25/2023</a:t>
+              <a:t>8/29/2023</a:t>
             </a:fld>
             <a:endParaRPr lang="en-US" dirty="0"/>
           </a:p>
@@ -5963,7 +5963,7 @@
             <a:fld id="{B61BEF0D-F0BB-DE4B-95CE-6DB70DBA9567}" type="datetimeFigureOut">
               <a:rPr lang="en-US" dirty="0"/>
               <a:pPr/>
-              <a:t>8/25/2023</a:t>
+              <a:t>8/29/2023</a:t>
             </a:fld>
             <a:endParaRPr lang="en-US" dirty="0"/>
           </a:p>
@@ -6126,7 +6126,7 @@
             <a:fld id="{B61BEF0D-F0BB-DE4B-95CE-6DB70DBA9567}" type="datetimeFigureOut">
               <a:rPr lang="en-US" dirty="0"/>
               <a:pPr/>
-              <a:t>8/25/2023</a:t>
+              <a:t>8/29/2023</a:t>
             </a:fld>
             <a:endParaRPr lang="en-US" dirty="0"/>
           </a:p>
@@ -6223,7 +6223,7 @@
             <a:fld id="{B61BEF0D-F0BB-DE4B-95CE-6DB70DBA9567}" type="datetimeFigureOut">
               <a:rPr lang="en-US" dirty="0"/>
               <a:pPr/>
-              <a:t>8/25/2023</a:t>
+              <a:t>8/29/2023</a:t>
             </a:fld>
             <a:endParaRPr lang="en-US" dirty="0"/>
           </a:p>
@@ -6601,7 +6601,7 @@
             <a:fld id="{B61BEF0D-F0BB-DE4B-95CE-6DB70DBA9567}" type="datetimeFigureOut">
               <a:rPr lang="en-US" dirty="0"/>
               <a:pPr/>
-              <a:t>8/25/2023</a:t>
+              <a:t>8/29/2023</a:t>
             </a:fld>
             <a:endParaRPr lang="en-US" dirty="0"/>
           </a:p>
@@ -6887,7 +6887,7 @@
             <a:fld id="{B61BEF0D-F0BB-DE4B-95CE-6DB70DBA9567}" type="datetimeFigureOut">
               <a:rPr lang="en-US" dirty="0"/>
               <a:pPr/>
-              <a:t>8/25/2023</a:t>
+              <a:t>8/29/2023</a:t>
             </a:fld>
             <a:endParaRPr lang="en-US" dirty="0"/>
           </a:p>
@@ -7126,7 +7126,7 @@
             <a:fld id="{B61BEF0D-F0BB-DE4B-95CE-6DB70DBA9567}" type="datetimeFigureOut">
               <a:rPr lang="en-US" dirty="0"/>
               <a:pPr/>
-              <a:t>8/25/2023</a:t>
+              <a:t>8/29/2023</a:t>
             </a:fld>
             <a:endParaRPr lang="en-US" dirty="0"/>
           </a:p>
@@ -7970,6 +7970,13 @@
             <a:schemeClr val="lt1"/>
           </a:fontRef>
         </p:style>
+        <p:txBody>
+          <a:bodyPr/>
+          <a:lstStyle/>
+          <a:p>
+            <a:endParaRPr lang="it-IT"/>
+          </a:p>
+        </p:txBody>
       </p:sp>
       <p:sp>
         <p:nvSpPr>
@@ -8006,7 +8013,7 @@
           <a:p>
             <a:pPr algn="ctr"/>
             <a:r>
-              <a:rPr lang="it-IT" sz="2400" err="1">
+              <a:rPr lang="it-IT" sz="2400" dirty="0" err="1">
                 <a:ea typeface="+mn-lt"/>
                 <a:cs typeface="+mn-lt"/>
               </a:rPr>
@@ -8053,7 +8060,7 @@
               <a:t>s319103 </a:t>
             </a:r>
             <a:r>
-              <a:rPr lang="it-IT" sz="2400" err="1">
+              <a:rPr lang="it-IT" sz="2400" dirty="0" err="1">
                 <a:ea typeface="+mn-lt"/>
                 <a:cs typeface="+mn-lt"/>
               </a:rPr>
@@ -8064,16 +8071,9 @@
                 <a:ea typeface="+mn-lt"/>
                 <a:cs typeface="+mn-lt"/>
               </a:rPr>
-              <a:t> </a:t>
-            </a:r>
-            <a:r>
-              <a:rPr lang="it-IT" sz="2400" err="1">
-                <a:ea typeface="+mn-lt"/>
-                <a:cs typeface="+mn-lt"/>
-              </a:rPr>
-              <a:t>Endri</a:t>
-            </a:r>
-            <a:endParaRPr lang="it-IT" sz="2400"/>
+              <a:t> Endri</a:t>
+            </a:r>
+            <a:endParaRPr lang="it-IT" sz="2400" dirty="0"/>
           </a:p>
         </p:txBody>
       </p:sp>
@@ -8200,7 +8200,7 @@
               <a:t>In </a:t>
             </a:r>
             <a:r>
-              <a:rPr lang="it-IT" sz="2000" err="1">
+              <a:rPr lang="it-IT" sz="2000" dirty="0" err="1">
                 <a:ea typeface="+mn-lt"/>
                 <a:cs typeface="+mn-lt"/>
               </a:rPr>
@@ -8211,9 +8211,9 @@
                 <a:ea typeface="+mn-lt"/>
                 <a:cs typeface="+mn-lt"/>
               </a:rPr>
-              <a:t> la memoria fisica viene suddivisa in 3 intervalli d'indirizzi, detti zone. </a:t>
-            </a:r>
-            <a:endParaRPr lang="it-IT" sz="2000"/>
+              <a:t> la memoria fisica viene suddivisa in 3 intervalli d'indirizzi, detti zone: </a:t>
+            </a:r>
+            <a:endParaRPr lang="it-IT" sz="2000" dirty="0"/>
           </a:p>
         </p:txBody>
       </p:sp>
@@ -8472,7 +8472,7 @@
                 <a:ea typeface="+mn-lt"/>
                 <a:cs typeface="+mn-lt"/>
               </a:rPr>
-              <a:t> mapping.</a:t>
+              <a:t> mapping;</a:t>
             </a:r>
           </a:p>
           <a:p>
@@ -8489,9 +8489,9 @@
                 <a:ea typeface="+mn-lt"/>
                 <a:cs typeface="+mn-lt"/>
               </a:rPr>
-              <a:t> (16-896 MB): contiene la memoria assegnata al kernel in maniera permanente. Viene inizializzata all'avvio con l'immagine del kernel (e spazio extra)</a:t>
-            </a:r>
-            <a:endParaRPr lang="it-IT" sz="2000"/>
+              <a:t> (16-896 MB): contiene la memoria assegnata al kernel in maniera permanente. Viene inizializzata all'avvio con l'immagine del kernel (e spazio extra);</a:t>
+            </a:r>
+            <a:endParaRPr lang="it-IT" sz="2000" dirty="0"/>
           </a:p>
           <a:p>
             <a:pPr marL="305435" indent="-305435"/>
@@ -8535,7 +8535,7 @@
                 <a:ea typeface="+mn-lt"/>
                 <a:cs typeface="+mn-lt"/>
               </a:rPr>
-              <a:t>, questa zona è inclusa in NORMAL)</a:t>
+              <a:t>, questa zona è inclusa in NORMAL).</a:t>
             </a:r>
             <a:endParaRPr lang="it-IT" sz="2000" dirty="0"/>
           </a:p>
@@ -8836,7 +8836,7 @@
               <a:t>La struttura dati usata dal kernel per gestire le informazioni su una data zona (situata in </a:t>
             </a:r>
             <a:r>
-              <a:rPr lang="it-IT" sz="2400" i="1" err="1">
+              <a:rPr lang="it-IT" sz="2400" i="1" dirty="0" err="1">
                 <a:ea typeface="+mn-lt"/>
                 <a:cs typeface="+mn-lt"/>
               </a:rPr>
@@ -8850,7 +8850,7 @@
               <a:t>/</a:t>
             </a:r>
             <a:r>
-              <a:rPr lang="it-IT" sz="2400" i="1" err="1">
+              <a:rPr lang="it-IT" sz="2400" i="1" dirty="0" err="1">
                 <a:ea typeface="+mn-lt"/>
                 <a:cs typeface="+mn-lt"/>
               </a:rPr>
@@ -8864,7 +8864,7 @@
               <a:t>/</a:t>
             </a:r>
             <a:r>
-              <a:rPr lang="it-IT" sz="2400" i="1" err="1">
+              <a:rPr lang="it-IT" sz="2400" i="1" dirty="0" err="1">
                 <a:ea typeface="+mn-lt"/>
                 <a:cs typeface="+mn-lt"/>
               </a:rPr>
@@ -8875,7 +8875,7 @@
                 <a:ea typeface="+mn-lt"/>
                 <a:cs typeface="+mn-lt"/>
               </a:rPr>
-              <a:t>)</a:t>
+              <a:t>):</a:t>
             </a:r>
           </a:p>
         </p:txBody>
@@ -9175,14 +9175,14 @@
               <a:t>Al momento del boot, in maniera simile alla </a:t>
             </a:r>
             <a:r>
-              <a:rPr lang="it-IT" sz="2400" i="1" err="1">
+              <a:rPr lang="it-IT" sz="2400" i="1" dirty="0" err="1">
                 <a:ea typeface="+mn-lt"/>
                 <a:cs typeface="+mn-lt"/>
               </a:rPr>
               <a:t>ram</a:t>
             </a:r>
             <a:r>
-              <a:rPr lang="it-IT" sz="2400" err="1">
+              <a:rPr lang="it-IT" sz="2400" dirty="0" err="1">
                 <a:ea typeface="+mn-lt"/>
                 <a:cs typeface="+mn-lt"/>
               </a:rPr>
@@ -9199,7 +9199,7 @@
           </a:p>
           <a:p>
             <a:pPr marL="305435" indent="-305435"/>
-            <a:endParaRPr lang="it-IT"/>
+            <a:endParaRPr lang="it-IT" dirty="0"/>
           </a:p>
           <a:p>
             <a:pPr marL="305435" indent="-305435"/>
@@ -9294,7 +9294,7 @@
           </a:p>
           <a:p>
             <a:pPr marL="305435" indent="-305435"/>
-            <a:endParaRPr lang="it-IT"/>
+            <a:endParaRPr lang="it-IT" dirty="0"/>
           </a:p>
           <a:p>
             <a:pPr marL="305435" indent="-305435"/>
@@ -9625,9 +9625,9 @@
                 <a:ea typeface="+mn-lt"/>
                 <a:cs typeface="+mn-lt"/>
               </a:rPr>
-              <a:t> </a:t>
-            </a:r>
-            <a:endParaRPr lang="it-IT">
+              <a:t>.</a:t>
+            </a:r>
+            <a:endParaRPr lang="it-IT" dirty="0">
               <a:ea typeface="+mn-lt"/>
               <a:cs typeface="+mn-lt"/>
             </a:endParaRPr>
@@ -9642,7 +9642,7 @@
               <a:t>(in </a:t>
             </a:r>
             <a:r>
-              <a:rPr lang="it-IT" sz="2400" i="1" err="1">
+              <a:rPr lang="it-IT" sz="2400" i="1" dirty="0" err="1">
                 <a:ea typeface="+mn-lt"/>
                 <a:cs typeface="+mn-lt"/>
               </a:rPr>
@@ -9656,7 +9656,7 @@
               <a:t>/</a:t>
             </a:r>
             <a:r>
-              <a:rPr lang="it-IT" sz="2400" i="1" err="1">
+              <a:rPr lang="it-IT" sz="2400" i="1" dirty="0" err="1">
                 <a:ea typeface="+mn-lt"/>
                 <a:cs typeface="+mn-lt"/>
               </a:rPr>
@@ -9670,7 +9670,7 @@
               <a:t>/</a:t>
             </a:r>
             <a:r>
-              <a:rPr lang="it-IT" sz="2400" i="1" err="1">
+              <a:rPr lang="it-IT" sz="2400" i="1" dirty="0" err="1">
                 <a:ea typeface="+mn-lt"/>
                 <a:cs typeface="+mn-lt"/>
               </a:rPr>
@@ -9681,7 +9681,7 @@
                 <a:ea typeface="+mn-lt"/>
                 <a:cs typeface="+mn-lt"/>
               </a:rPr>
-              <a:t>) che prende come parametro le informazioni di boot</a:t>
+              <a:t>) che prende come parametro le informazioni di boot.</a:t>
             </a:r>
             <a:endParaRPr lang="it-IT" dirty="0"/>
           </a:p>
@@ -9883,7 +9883,7 @@
               <a:t>Mette a disposizione due funzioni per gestire la richiesta ed il rilascio dei frames sia per processi kernel sia per quelli utente: </a:t>
             </a:r>
             <a:r>
-              <a:rPr lang="it-IT" sz="2400" i="1" err="1">
+              <a:rPr lang="it-IT" sz="2400" i="1" dirty="0" err="1">
                 <a:ea typeface="+mn-lt"/>
                 <a:cs typeface="+mn-lt"/>
               </a:rPr>
@@ -9904,13 +9904,20 @@
               <a:t> </a:t>
             </a:r>
             <a:r>
-              <a:rPr lang="it-IT" sz="2400" i="1" err="1">
+              <a:rPr lang="it-IT" sz="2400" i="1" dirty="0" err="1">
                 <a:ea typeface="+mn-lt"/>
                 <a:cs typeface="+mn-lt"/>
               </a:rPr>
               <a:t>free_pages</a:t>
             </a:r>
-            <a:endParaRPr lang="it-IT" sz="2400" i="1" err="1"/>
+            <a:r>
+              <a:rPr lang="it-IT" sz="2400" i="1" dirty="0">
+                <a:ea typeface="+mn-lt"/>
+                <a:cs typeface="+mn-lt"/>
+              </a:rPr>
+              <a:t>.</a:t>
+            </a:r>
+            <a:endParaRPr lang="it-IT" sz="2400" i="1" dirty="0"/>
           </a:p>
           <a:p>
             <a:pPr marL="305435" indent="-305435"/>
@@ -10021,7 +10028,7 @@
               <a:buChar char="§"/>
             </a:pPr>
             <a:r>
-              <a:rPr lang="it-IT" sz="2400" b="1" err="1">
+              <a:rPr lang="it-IT" sz="2400" b="1" dirty="0" err="1">
                 <a:ea typeface="+mn-lt"/>
                 <a:cs typeface="+mn-lt"/>
               </a:rPr>
@@ -10035,7 +10042,7 @@
               <a:t> * </a:t>
             </a:r>
             <a:r>
-              <a:rPr lang="it-IT" sz="2400" b="1" err="1">
+              <a:rPr lang="it-IT" sz="2400" b="1" dirty="0" err="1">
                 <a:ea typeface="+mn-lt"/>
                 <a:cs typeface="+mn-lt"/>
               </a:rPr>
@@ -10049,7 +10056,7 @@
               <a:t>(zone, </a:t>
             </a:r>
             <a:r>
-              <a:rPr lang="it-IT" sz="2400" b="1" err="1">
+              <a:rPr lang="it-IT" sz="2400" b="1" dirty="0" err="1">
                 <a:ea typeface="+mn-lt"/>
                 <a:cs typeface="+mn-lt"/>
               </a:rPr>
@@ -10060,7 +10067,7 @@
                 <a:ea typeface="+mn-lt"/>
                 <a:cs typeface="+mn-lt"/>
               </a:rPr>
-              <a:t>)</a:t>
+              <a:t>):</a:t>
             </a:r>
             <a:endParaRPr lang="it-IT" sz="2400" b="1" dirty="0"/>
           </a:p>
@@ -10071,7 +10078,23 @@
             </a:pPr>
             <a:r>
               <a:rPr lang="it-IT" sz="2400" dirty="0"/>
-              <a:t>Usata per richiedere 2^order frame contigui ad una data zona. Restituisce la prima pagina del blocco di 2^order oppure NULL se non ha successo.</a:t>
+              <a:t>Usata per richiedere 2</a:t>
+            </a:r>
+            <a:r>
+              <a:rPr lang="it-IT" sz="2400" baseline="30000" dirty="0"/>
+              <a:t>order </a:t>
+            </a:r>
+            <a:r>
+              <a:rPr lang="it-IT" sz="2400" dirty="0"/>
+              <a:t>frame contigui ad una data zona. Restituisce la prima pagina del blocco di 2</a:t>
+            </a:r>
+            <a:r>
+              <a:rPr lang="it-IT" sz="2400" baseline="30000" dirty="0"/>
+              <a:t>order </a:t>
+            </a:r>
+            <a:r>
+              <a:rPr lang="it-IT" sz="2400" dirty="0"/>
+              <a:t>oppure NULL se non ha successo;</a:t>
             </a:r>
           </a:p>
           <a:p>
@@ -10145,7 +10168,7 @@
             </a:r>
             <a:r>
               <a:rPr lang="it-IT" sz="2400" i="1" dirty="0"/>
-              <a:t> system </a:t>
+              <a:t> system.</a:t>
             </a:r>
             <a:endParaRPr lang="it-IT" sz="2400" dirty="0"/>
           </a:p>
@@ -10433,7 +10456,7 @@
           </a:p>
           <a:p>
             <a:pPr marL="305435" indent="-305435"/>
-            <a:endParaRPr lang="it-IT"/>
+            <a:endParaRPr lang="it-IT" dirty="0"/>
           </a:p>
           <a:p>
             <a:pPr marL="305435" indent="-305435"/>
@@ -10445,7 +10468,7 @@
               <a:t>PG_FROM_BBSTRUCT(</a:t>
             </a:r>
             <a:r>
-              <a:rPr lang="it-IT" sz="2400" i="1" err="1">
+              <a:rPr lang="it-IT" sz="2400" i="1" dirty="0" err="1">
                 <a:ea typeface="+mn-lt"/>
                 <a:cs typeface="+mn-lt"/>
               </a:rPr>
@@ -10459,7 +10482,7 @@
               <a:t>, page, </a:t>
             </a:r>
             <a:r>
-              <a:rPr lang="it-IT" sz="2400" i="1" err="1">
+              <a:rPr lang="it-IT" sz="2400" i="1" dirty="0" err="1">
                 <a:ea typeface="+mn-lt"/>
                 <a:cs typeface="+mn-lt"/>
               </a:rPr>
@@ -10480,7 +10503,7 @@
               <a:t> restituisce l'indirizzo di un dato elemento con un certo tipo di pagina, a partire dalla </a:t>
             </a:r>
             <a:r>
-              <a:rPr lang="it-IT" sz="2400" i="1" err="1">
+              <a:rPr lang="it-IT" sz="2400" i="1" dirty="0" err="1">
                 <a:ea typeface="+mn-lt"/>
                 <a:cs typeface="+mn-lt"/>
               </a:rPr>
@@ -10491,13 +10514,13 @@
                 <a:ea typeface="+mn-lt"/>
                 <a:cs typeface="+mn-lt"/>
               </a:rPr>
-              <a:t> fornita</a:t>
+              <a:t> fornita.</a:t>
             </a:r>
             <a:endParaRPr lang="it-IT" dirty="0"/>
           </a:p>
           <a:p>
             <a:pPr marL="305435" indent="-305435"/>
-            <a:endParaRPr lang="it-IT"/>
+            <a:endParaRPr lang="it-IT" dirty="0"/>
           </a:p>
           <a:p>
             <a:pPr marL="305435" indent="-305435"/>
@@ -10571,7 +10594,7 @@
               </a:rPr>
               <a:t>. </a:t>
             </a:r>
-            <a:endParaRPr lang="it-IT"/>
+            <a:endParaRPr lang="it-IT" dirty="0"/>
           </a:p>
         </p:txBody>
       </p:sp>
@@ -10733,7 +10756,7 @@
                 <a:ea typeface="+mn-lt"/>
                 <a:cs typeface="+mn-lt"/>
               </a:rPr>
-              <a:t> *page)</a:t>
+              <a:t> *page):</a:t>
             </a:r>
           </a:p>
           <a:p>
@@ -10743,7 +10766,22 @@
                 <a:ea typeface="+mn-lt"/>
                 <a:cs typeface="+mn-lt"/>
               </a:rPr>
-              <a:t>Funzione utilizzata per rilasciare 2^order frame contigui in una data zona.</a:t>
+              <a:t>Funzione utilizzata per rilasciare </a:t>
+            </a:r>
+            <a:r>
+              <a:rPr lang="it-IT" sz="2400" dirty="0"/>
+              <a:t>2</a:t>
+            </a:r>
+            <a:r>
+              <a:rPr lang="it-IT" sz="2400" baseline="30000" dirty="0"/>
+              <a:t>order  </a:t>
+            </a:r>
+            <a:r>
+              <a:rPr lang="it-IT" sz="2400" dirty="0">
+                <a:ea typeface="+mn-lt"/>
+                <a:cs typeface="+mn-lt"/>
+              </a:rPr>
+              <a:t>frame contigui in una data zona.</a:t>
             </a:r>
             <a:endParaRPr lang="it-IT" sz="2400" b="1" dirty="0">
               <a:ea typeface="+mn-lt"/>
@@ -10773,7 +10811,7 @@
               <a:t>Come </a:t>
             </a:r>
             <a:r>
-              <a:rPr lang="it-IT" sz="2400" err="1">
+              <a:rPr lang="it-IT" sz="2400" dirty="0" err="1">
                 <a:ea typeface="+mn-lt"/>
                 <a:cs typeface="+mn-lt"/>
               </a:rPr>
@@ -10787,7 +10825,7 @@
               <a:t>, utilizza una funzione del </a:t>
             </a:r>
             <a:r>
-              <a:rPr lang="it-IT" sz="2400" err="1">
+              <a:rPr lang="it-IT" sz="2400" dirty="0" err="1">
                 <a:ea typeface="+mn-lt"/>
                 <a:cs typeface="+mn-lt"/>
               </a:rPr>
@@ -10801,7 +10839,7 @@
               <a:t> system,  </a:t>
             </a:r>
             <a:r>
-              <a:rPr lang="it-IT" sz="2400" err="1">
+              <a:rPr lang="it-IT" sz="2400" dirty="0" err="1">
                 <a:ea typeface="+mn-lt"/>
                 <a:cs typeface="+mn-lt"/>
               </a:rPr>
@@ -10815,7 +10853,7 @@
               <a:t> (definita in </a:t>
             </a:r>
             <a:r>
-              <a:rPr lang="it-IT" sz="2400" err="1">
+              <a:rPr lang="it-IT" sz="2400" dirty="0" err="1">
                 <a:ea typeface="+mn-lt"/>
                 <a:cs typeface="+mn-lt"/>
               </a:rPr>
@@ -10829,7 +10867,7 @@
               <a:t>/</a:t>
             </a:r>
             <a:r>
-              <a:rPr lang="it-IT" sz="2400" err="1">
+              <a:rPr lang="it-IT" sz="2400" dirty="0" err="1">
                 <a:ea typeface="+mn-lt"/>
                 <a:cs typeface="+mn-lt"/>
               </a:rPr>
@@ -10843,7 +10881,7 @@
               <a:t>/</a:t>
             </a:r>
             <a:r>
-              <a:rPr lang="it-IT" sz="2400" err="1">
+              <a:rPr lang="it-IT" sz="2400" dirty="0" err="1">
                 <a:ea typeface="+mn-lt"/>
                 <a:cs typeface="+mn-lt"/>
               </a:rPr>
@@ -10854,9 +10892,9 @@
                 <a:ea typeface="+mn-lt"/>
                 <a:cs typeface="+mn-lt"/>
               </a:rPr>
-              <a:t>) </a:t>
-            </a:r>
-            <a:endParaRPr lang="it-IT" sz="2400"/>
+              <a:t>).</a:t>
+            </a:r>
+            <a:endParaRPr lang="it-IT" sz="2400" dirty="0"/>
           </a:p>
         </p:txBody>
       </p:sp>
@@ -11118,7 +11156,7 @@
           <a:p>
             <a:pPr marL="305435" indent="-305435"/>
             <a:r>
-              <a:rPr lang="it-IT" sz="2400" i="1" err="1">
+              <a:rPr lang="it-IT" sz="2400" i="1" dirty="0" err="1">
                 <a:ea typeface="+mn-lt"/>
                 <a:cs typeface="+mn-lt"/>
               </a:rPr>
@@ -11202,7 +11240,7 @@
                 <a:ea typeface="+mn-lt"/>
                 <a:cs typeface="+mn-lt"/>
               </a:rPr>
-              <a:t>, v)</a:t>
+              <a:t>, v).</a:t>
             </a:r>
             <a:endParaRPr lang="it-IT" i="1" dirty="0"/>
           </a:p>
@@ -11653,7 +11691,7 @@
               </a:rPr>
               <a:t> è una strategia robusta ed efficiente per l'allocazione di gruppi contigui di frame (in potenze di due). È la strategia standard utilizzata dai sistemi Linux.</a:t>
             </a:r>
-            <a:endParaRPr lang="it-IT" sz="2400"/>
+            <a:endParaRPr lang="it-IT" sz="2400" dirty="0"/>
           </a:p>
           <a:p>
             <a:pPr marL="305435" indent="-305435"/>
@@ -11719,7 +11757,7 @@
             </a:r>
             <a:r>
               <a:rPr lang="it-IT" sz="2400" dirty="0"/>
-              <a:t>) che viene linkato come se fosse una libreria statica al momento della compilazione del sistema</a:t>
+              <a:t>) che viene linkato come se fosse una libreria statica al momento della compilazione del sistema.</a:t>
             </a:r>
           </a:p>
           <a:p>
@@ -12021,9 +12059,9 @@
                 <a:ea typeface="+mn-lt"/>
                 <a:cs typeface="+mn-lt"/>
               </a:rPr>
-              <a:t>Ricerca di un blocco grande a sufficienza da soddisfare la richiesta</a:t>
-            </a:r>
-            <a:endParaRPr lang="it-IT" sz="2400"/>
+              <a:t>Ricerca di un blocco grande a sufficienza da soddisfare la richiesta;</a:t>
+            </a:r>
+            <a:endParaRPr lang="it-IT" sz="2400" dirty="0"/>
           </a:p>
           <a:p>
             <a:pPr marL="781685" lvl="1" indent="-457200">
@@ -12034,9 +12072,9 @@
                 <a:ea typeface="+mn-lt"/>
                 <a:cs typeface="+mn-lt"/>
               </a:rPr>
-              <a:t>Rimozione di un blocco di frame liberi dalla lista</a:t>
-            </a:r>
-            <a:endParaRPr lang="it-IT" sz="2400"/>
+              <a:t>Rimozione di un blocco di frame liberi dalla lista;</a:t>
+            </a:r>
+            <a:endParaRPr lang="it-IT" sz="2400" dirty="0"/>
           </a:p>
           <a:p>
             <a:pPr marL="781685" lvl="1" indent="-457200">
@@ -12050,7 +12088,7 @@
               <a:t>Separare il blocco a metà ricorsivamente finché non si ottiene la minima potenza di due in grado di soddisfare la richiesta. Ogni divisione genera due metà, quella su cui si ricorre ed un'altra (il </a:t>
             </a:r>
             <a:r>
-              <a:rPr lang="it-IT" sz="2400" i="1" err="1">
+              <a:rPr lang="it-IT" sz="2400" i="1" dirty="0" err="1">
                 <a:ea typeface="+mn-lt"/>
                 <a:cs typeface="+mn-lt"/>
               </a:rPr>
@@ -12061,9 +12099,9 @@
                 <a:ea typeface="+mn-lt"/>
                 <a:cs typeface="+mn-lt"/>
               </a:rPr>
-              <a:t>) che verrà aggiunta alla lista di blocchi liberi della dimensione corrispondente</a:t>
-            </a:r>
-            <a:endParaRPr lang="it-IT" sz="2400"/>
+              <a:t>) che verrà aggiunta alla lista di blocchi liberi della dimensione corrispondente.</a:t>
+            </a:r>
+            <a:endParaRPr lang="it-IT" sz="2400" dirty="0"/>
           </a:p>
         </p:txBody>
       </p:sp>
@@ -12200,12 +12238,12 @@
               </a:rPr>
               <a:t> per  la gestione delle strutture dati del kernel.</a:t>
             </a:r>
-            <a:endParaRPr lang="it-IT" sz="2400"/>
+            <a:endParaRPr lang="it-IT" sz="2400" dirty="0"/>
           </a:p>
           <a:p>
             <a:pPr marL="305435" indent="-305435"/>
             <a:r>
-              <a:rPr lang="it-IT" sz="2400" err="1">
+              <a:rPr lang="it-IT" sz="2400" dirty="0" err="1">
                 <a:ea typeface="+mn-lt"/>
                 <a:cs typeface="+mn-lt"/>
               </a:rPr>
@@ -12219,7 +12257,7 @@
               <a:t> mette quindi a disposizione delle vari metodi e strutture dati (in </a:t>
             </a:r>
             <a:r>
-              <a:rPr lang="it-IT" sz="2400" i="1" err="1">
+              <a:rPr lang="it-IT" sz="2400" i="1" dirty="0" err="1">
                 <a:ea typeface="+mn-lt"/>
                 <a:cs typeface="+mn-lt"/>
               </a:rPr>
@@ -12233,7 +12271,7 @@
               <a:t>/</a:t>
             </a:r>
             <a:r>
-              <a:rPr lang="it-IT" sz="2400" i="1" err="1">
+              <a:rPr lang="it-IT" sz="2400" i="1" dirty="0" err="1">
                 <a:ea typeface="+mn-lt"/>
                 <a:cs typeface="+mn-lt"/>
               </a:rPr>
@@ -12247,7 +12285,7 @@
               <a:t>/</a:t>
             </a:r>
             <a:r>
-              <a:rPr lang="it-IT" sz="2400" i="1" err="1">
+              <a:rPr lang="it-IT" sz="2400" i="1" dirty="0" err="1">
                 <a:ea typeface="+mn-lt"/>
                 <a:cs typeface="+mn-lt"/>
               </a:rPr>
@@ -12261,7 +12299,7 @@
               <a:t>) per la creazione, gestione e distruzione di queste </a:t>
             </a:r>
             <a:r>
-              <a:rPr lang="it-IT" sz="2400" err="1">
+              <a:rPr lang="it-IT" sz="2400" dirty="0" err="1">
                 <a:ea typeface="+mn-lt"/>
                 <a:cs typeface="+mn-lt"/>
               </a:rPr>
@@ -12285,7 +12323,7 @@
               <a:t>Quando lo </a:t>
             </a:r>
             <a:r>
-              <a:rPr lang="it-IT" sz="2400" i="1" err="1">
+              <a:rPr lang="it-IT" sz="2400" i="1" dirty="0" err="1">
                 <a:ea typeface="+mn-lt"/>
                 <a:cs typeface="+mn-lt"/>
               </a:rPr>
@@ -12299,7 +12337,7 @@
               <a:t> </a:t>
             </a:r>
             <a:r>
-              <a:rPr lang="it-IT" sz="2400" i="1" err="1">
+              <a:rPr lang="it-IT" sz="2400" i="1" dirty="0" err="1">
                 <a:ea typeface="+mn-lt"/>
                 <a:cs typeface="+mn-lt"/>
               </a:rPr>
@@ -12313,7 +12351,7 @@
               <a:t> necessita di più memoria, la ottiene dal </a:t>
             </a:r>
             <a:r>
-              <a:rPr lang="it-IT" sz="2400" err="1">
+              <a:rPr lang="it-IT" sz="2400" dirty="0" err="1">
                 <a:ea typeface="+mn-lt"/>
                 <a:cs typeface="+mn-lt"/>
               </a:rPr>
@@ -12327,7 +12365,7 @@
               <a:t> </a:t>
             </a:r>
             <a:r>
-              <a:rPr lang="it-IT" sz="2400" err="1">
+              <a:rPr lang="it-IT" sz="2400" dirty="0" err="1">
                 <a:ea typeface="+mn-lt"/>
                 <a:cs typeface="+mn-lt"/>
               </a:rPr>
@@ -12338,9 +12376,9 @@
                 <a:ea typeface="+mn-lt"/>
                 <a:cs typeface="+mn-lt"/>
               </a:rPr>
-              <a:t> visto precedentemente</a:t>
-            </a:r>
-            <a:endParaRPr lang="it-IT" sz="2400"/>
+              <a:t> visto precedentemente.</a:t>
+            </a:r>
+            <a:endParaRPr lang="it-IT" sz="2400" dirty="0"/>
           </a:p>
           <a:p>
             <a:pPr marL="305435" indent="-305435"/>
@@ -12621,7 +12659,7 @@
               <a:t>La struttura dati che definisce una cache usata dallo </a:t>
             </a:r>
             <a:r>
-              <a:rPr lang="it-IT" sz="2400" err="1">
+              <a:rPr lang="it-IT" sz="2400" dirty="0" err="1">
                 <a:ea typeface="+mn-lt"/>
                 <a:cs typeface="+mn-lt"/>
               </a:rPr>
@@ -12635,7 +12673,7 @@
               <a:t> </a:t>
             </a:r>
             <a:r>
-              <a:rPr lang="it-IT" sz="2400" err="1">
+              <a:rPr lang="it-IT" sz="2400" dirty="0" err="1">
                 <a:ea typeface="+mn-lt"/>
                 <a:cs typeface="+mn-lt"/>
               </a:rPr>
@@ -12711,9 +12749,9 @@
                 <a:ea typeface="+mn-lt"/>
                 <a:cs typeface="+mn-lt"/>
               </a:rPr>
-              <a:t> dedicato per le strutture del kernel</a:t>
-            </a:r>
-            <a:endParaRPr lang="it-IT" sz="2000"/>
+              <a:t> dedicato per le strutture del kernel.</a:t>
+            </a:r>
+            <a:endParaRPr lang="it-IT" sz="2000" dirty="0"/>
           </a:p>
         </p:txBody>
       </p:sp>
@@ -13029,9 +13067,9 @@
                 <a:ea typeface="+mn-lt"/>
                 <a:cs typeface="+mn-lt"/>
               </a:rPr>
-              <a:t>Separazione dello spazio kernel e utente</a:t>
-            </a:r>
-            <a:endParaRPr lang="it-IT" sz="2200"/>
+              <a:t>Separazione dello spazio kernel e utente;</a:t>
+            </a:r>
+            <a:endParaRPr lang="it-IT" sz="2200" dirty="0"/>
           </a:p>
           <a:p>
             <a:pPr marL="629920" lvl="1" indent="-305435"/>
@@ -13040,9 +13078,9 @@
                 <a:ea typeface="+mn-lt"/>
                 <a:cs typeface="+mn-lt"/>
               </a:rPr>
-              <a:t>Ogni frame può avere diversi permessi d'accesso</a:t>
-            </a:r>
-            <a:endParaRPr lang="it-IT" sz="2200"/>
+              <a:t>Ogni frame può avere diversi permessi d'accesso;</a:t>
+            </a:r>
+            <a:endParaRPr lang="it-IT" sz="2200" dirty="0"/>
           </a:p>
           <a:p>
             <a:pPr marL="629920" lvl="1" indent="-305435"/>
@@ -13051,9 +13089,9 @@
                 <a:ea typeface="+mn-lt"/>
                 <a:cs typeface="+mn-lt"/>
               </a:rPr>
-              <a:t>Un processo può accedere solo ad un preciso sottoinsieme della memoria fisica disponibile (protezione)</a:t>
-            </a:r>
-            <a:endParaRPr lang="it-IT" sz="2200"/>
+              <a:t>Un processo può accedere solo ad un preciso sottoinsieme della memoria fisica disponibile (protezione);</a:t>
+            </a:r>
+            <a:endParaRPr lang="it-IT" sz="2200" dirty="0"/>
           </a:p>
           <a:p>
             <a:pPr marL="629920" lvl="1" indent="-305435"/>
@@ -13062,9 +13100,9 @@
                 <a:ea typeface="+mn-lt"/>
                 <a:cs typeface="+mn-lt"/>
               </a:rPr>
-              <a:t>I processi possono venire rilocati</a:t>
-            </a:r>
-            <a:endParaRPr lang="it-IT" sz="2200"/>
+              <a:t>I processi possono venire rilocati.</a:t>
+            </a:r>
+            <a:endParaRPr lang="it-IT" sz="2200" dirty="0"/>
           </a:p>
         </p:txBody>
       </p:sp>
@@ -13332,7 +13370,7 @@
               </a:rPr>
               <a:t>Come avviene in OS161, gli spazi d'indirizzamento virtuale sono separati, con lo spazio kernel sito agli indirizzi più alti. I processi kernel vedono gli indirizzi utente come nel loro spazio d'indirizzamento, mentre non è vero il contrario. </a:t>
             </a:r>
-            <a:endParaRPr lang="it-IT"/>
+            <a:endParaRPr lang="it-IT" dirty="0"/>
           </a:p>
           <a:p>
             <a:pPr marL="305435" indent="-305435"/>
@@ -13341,7 +13379,7 @@
                 <a:ea typeface="+mn-lt"/>
                 <a:cs typeface="+mn-lt"/>
               </a:rPr>
-              <a:t>In maniera identica ad OS161, gli indirizzi fisici più bassi sono riservati al kernel</a:t>
+              <a:t>In maniera identica ad OS161, gli indirizzi fisici più bassi sono riservati al kernel.</a:t>
             </a:r>
             <a:endParaRPr lang="it-IT" dirty="0"/>
           </a:p>
@@ -13715,7 +13753,7 @@
                 <a:ea typeface="+mn-lt"/>
                 <a:cs typeface="+mn-lt"/>
               </a:rPr>
-              <a:t> viste in precedenza</a:t>
+              <a:t> viste in precedenza.</a:t>
             </a:r>
             <a:endParaRPr lang="it-IT" dirty="0">
               <a:ea typeface="+mn-lt"/>
@@ -13922,7 +13960,7 @@
                 <a:ea typeface="+mn-lt"/>
                 <a:cs typeface="+mn-lt"/>
               </a:rPr>
-              <a:t>) page fault con sostituzione di pagina</a:t>
+              <a:t>) page fault con sostituzione di pagina.</a:t>
             </a:r>
             <a:endParaRPr lang="it-IT" sz="2400" dirty="0"/>
           </a:p>
@@ -14367,7 +14405,7 @@
                 <a:ea typeface="+mn-lt"/>
                 <a:cs typeface="+mn-lt"/>
               </a:rPr>
-              <a:t> Entry (PTE) per ogni pagina</a:t>
+              <a:t> Entry (PTE) per ogni pagina.</a:t>
             </a:r>
             <a:endParaRPr lang="it-IT" dirty="0"/>
           </a:p>
@@ -14479,7 +14517,7 @@
                 <a:ea typeface="+mn-lt"/>
                 <a:cs typeface="+mn-lt"/>
               </a:rPr>
-              <a:t> bit</a:t>
+              <a:t> bit.</a:t>
             </a:r>
             <a:endParaRPr lang="it-IT" sz="2400" dirty="0"/>
           </a:p>
@@ -14621,22 +14659,49 @@
           </a:bodyPr>
           <a:lstStyle/>
           <a:p>
+            <a:pPr marL="0" indent="0">
+              <a:buNone/>
+            </a:pPr>
+            <a:r>
+              <a:rPr lang="it-IT" sz="2400" dirty="0" err="1">
+                <a:ea typeface="+mn-lt"/>
+                <a:cs typeface="+mn-lt"/>
+              </a:rPr>
+              <a:t>MentOS</a:t>
+            </a:r>
+            <a:r>
+              <a:rPr lang="it-IT" sz="2400" dirty="0">
+                <a:ea typeface="+mn-lt"/>
+                <a:cs typeface="+mn-lt"/>
+              </a:rPr>
+              <a:t> tiene traccia delle PTE di un processo raggruppandole in una struttura gerarchica a due livelli:</a:t>
+            </a:r>
+            <a:endParaRPr lang="it-IT" sz="2400" dirty="0"/>
+          </a:p>
+          <a:p>
             <a:pPr marL="305435" indent="-305435"/>
             <a:r>
+              <a:rPr lang="it-IT" sz="2400" dirty="0">
+                <a:ea typeface="+mn-lt"/>
+                <a:cs typeface="+mn-lt"/>
+              </a:rPr>
+              <a:t>Page Directory: contiene fino a 1024 indirizzi a Page </a:t>
+            </a:r>
+            <a:r>
               <a:rPr lang="it-IT" sz="2400" dirty="0" err="1">
                 <a:ea typeface="+mn-lt"/>
                 <a:cs typeface="+mn-lt"/>
               </a:rPr>
-              <a:t>MentOS</a:t>
-            </a:r>
-            <a:r>
-              <a:rPr lang="it-IT" sz="2400" dirty="0">
-                <a:ea typeface="+mn-lt"/>
-                <a:cs typeface="+mn-lt"/>
-              </a:rPr>
-              <a:t> tiene traccia delle PTE di un processo raggruppandole in una struttura gerarchica a due livelli:</a:t>
-            </a:r>
-            <a:endParaRPr lang="it-IT" sz="2400" dirty="0"/>
+              <a:t>Table</a:t>
+            </a:r>
+            <a:r>
+              <a:rPr lang="it-IT" sz="2400" dirty="0">
+                <a:ea typeface="+mn-lt"/>
+                <a:cs typeface="+mn-lt"/>
+              </a:rPr>
+              <a:t>. Viene individuata dai primi 10 bit d'indirizzo;</a:t>
+            </a:r>
+            <a:endParaRPr lang="it-IT" dirty="0"/>
           </a:p>
           <a:p>
             <a:pPr marL="305435" indent="-305435"/>
@@ -14645,7 +14710,7 @@
                 <a:ea typeface="+mn-lt"/>
                 <a:cs typeface="+mn-lt"/>
               </a:rPr>
-              <a:t>Page Directory: contiene fino a 1024 indirizzi a Page </a:t>
+              <a:t>Page </a:t>
             </a:r>
             <a:r>
               <a:rPr lang="it-IT" sz="2400" dirty="0" err="1">
@@ -14659,34 +14724,9 @@
                 <a:ea typeface="+mn-lt"/>
                 <a:cs typeface="+mn-lt"/>
               </a:rPr>
-              <a:t>. Viene individuata dai primi 10 bit d'indirizzo</a:t>
+              <a:t>: contiene fino a 1024 PTE. Individuata dai bit 12-22.</a:t>
             </a:r>
             <a:endParaRPr lang="it-IT" dirty="0"/>
-          </a:p>
-          <a:p>
-            <a:pPr marL="305435" indent="-305435"/>
-            <a:r>
-              <a:rPr lang="it-IT" sz="2400" dirty="0">
-                <a:ea typeface="+mn-lt"/>
-                <a:cs typeface="+mn-lt"/>
-              </a:rPr>
-              <a:t>Page </a:t>
-            </a:r>
-            <a:r>
-              <a:rPr lang="it-IT" sz="2400" dirty="0" err="1">
-                <a:ea typeface="+mn-lt"/>
-                <a:cs typeface="+mn-lt"/>
-              </a:rPr>
-              <a:t>Table</a:t>
-            </a:r>
-            <a:r>
-              <a:rPr lang="it-IT" sz="2400" dirty="0">
-                <a:ea typeface="+mn-lt"/>
-                <a:cs typeface="+mn-lt"/>
-              </a:rPr>
-              <a:t>: contiene fino a 1024 PTE. Individuata dai bit 12-22 </a:t>
-            </a:r>
-            <a:endParaRPr lang="it-IT"/>
           </a:p>
         </p:txBody>
       </p:sp>
@@ -15085,7 +15125,7 @@
                 <a:ea typeface="+mn-lt"/>
                 <a:cs typeface="+mn-lt"/>
               </a:rPr>
-              <a:t> del processo</a:t>
+              <a:t> del processo.</a:t>
             </a:r>
             <a:endParaRPr lang="it-IT" sz="2000" dirty="0"/>
           </a:p>
@@ -15234,7 +15274,7 @@
               <a:t>Il </a:t>
             </a:r>
             <a:r>
-              <a:rPr lang="it-IT" sz="2400" err="1">
+              <a:rPr lang="it-IT" sz="2400" dirty="0" err="1">
                 <a:ea typeface="+mn-lt"/>
                 <a:cs typeface="+mn-lt"/>
               </a:rPr>
@@ -15248,7 +15288,7 @@
               <a:t> </a:t>
             </a:r>
             <a:r>
-              <a:rPr lang="it-IT" sz="2400" err="1">
+              <a:rPr lang="it-IT" sz="2400" dirty="0" err="1">
                 <a:ea typeface="+mn-lt"/>
                 <a:cs typeface="+mn-lt"/>
               </a:rPr>
@@ -15262,7 +15302,7 @@
               <a:t> di un processo punta ad una lista di </a:t>
             </a:r>
             <a:r>
-              <a:rPr lang="it-IT" sz="2400" i="1" err="1">
+              <a:rPr lang="it-IT" sz="2400" i="1" dirty="0" err="1">
                 <a:ea typeface="+mn-lt"/>
                 <a:cs typeface="+mn-lt"/>
               </a:rPr>
@@ -15276,7 +15316,7 @@
               <a:t> </a:t>
             </a:r>
             <a:r>
-              <a:rPr lang="it-IT" sz="2400" i="1" err="1">
+              <a:rPr lang="it-IT" sz="2400" i="1" dirty="0" err="1">
                 <a:ea typeface="+mn-lt"/>
                 <a:cs typeface="+mn-lt"/>
               </a:rPr>
@@ -15290,7 +15330,7 @@
               <a:t> (</a:t>
             </a:r>
             <a:r>
-              <a:rPr lang="it-IT" sz="2400" i="1" err="1">
+              <a:rPr lang="it-IT" sz="2400" i="1" dirty="0" err="1">
                 <a:ea typeface="+mn-lt"/>
                 <a:cs typeface="+mn-lt"/>
               </a:rPr>
@@ -15304,7 +15344,7 @@
               <a:t>/</a:t>
             </a:r>
             <a:r>
-              <a:rPr lang="it-IT" sz="2400" i="1" err="1">
+              <a:rPr lang="it-IT" sz="2400" i="1" dirty="0" err="1">
                 <a:ea typeface="+mn-lt"/>
                 <a:cs typeface="+mn-lt"/>
               </a:rPr>
@@ -15318,7 +15358,7 @@
               <a:t>/</a:t>
             </a:r>
             <a:r>
-              <a:rPr lang="it-IT" sz="2400" i="1" err="1">
+              <a:rPr lang="it-IT" sz="2400" i="1" dirty="0" err="1">
                 <a:ea typeface="+mn-lt"/>
                 <a:cs typeface="+mn-lt"/>
               </a:rPr>
@@ -15331,7 +15371,7 @@
               </a:rPr>
               <a:t>). </a:t>
             </a:r>
-            <a:endParaRPr lang="it-IT" sz="2400"/>
+            <a:endParaRPr lang="it-IT" sz="2400" dirty="0"/>
           </a:p>
           <a:p>
             <a:pPr marL="305435" indent="-305435"/>
@@ -15343,7 +15383,7 @@
               <a:t>Ogni </a:t>
             </a:r>
             <a:r>
-              <a:rPr lang="it-IT" sz="2400" err="1">
+              <a:rPr lang="it-IT" sz="2400" dirty="0" err="1">
                 <a:ea typeface="+mn-lt"/>
                 <a:cs typeface="+mn-lt"/>
               </a:rPr>
@@ -15357,7 +15397,7 @@
               <a:t> </a:t>
             </a:r>
             <a:r>
-              <a:rPr lang="it-IT" sz="2400" err="1">
+              <a:rPr lang="it-IT" sz="2400" dirty="0" err="1">
                 <a:ea typeface="+mn-lt"/>
                 <a:cs typeface="+mn-lt"/>
               </a:rPr>
@@ -15370,7 +15410,7 @@
               </a:rPr>
               <a:t> definisce un'area contigua di memoria virtuale di dimensione multipla di 1 pagina logica (4KB). </a:t>
             </a:r>
-            <a:endParaRPr lang="it-IT" sz="2400"/>
+            <a:endParaRPr lang="it-IT" sz="2400" dirty="0"/>
           </a:p>
           <a:p>
             <a:pPr marL="305435" indent="-305435"/>
@@ -15608,7 +15648,7 @@
               <a:t> </a:t>
             </a:r>
             <a:r>
-              <a:rPr lang="it-IT" sz="2400" i="1" err="1">
+              <a:rPr lang="it-IT" sz="2400" i="1" dirty="0" err="1">
                 <a:ea typeface="+mn-lt"/>
                 <a:cs typeface="+mn-lt"/>
               </a:rPr>
@@ -15622,7 +15662,7 @@
               <a:t> </a:t>
             </a:r>
             <a:r>
-              <a:rPr lang="it-IT" sz="2400" i="1" err="1">
+              <a:rPr lang="it-IT" sz="2400" i="1" dirty="0" err="1">
                 <a:ea typeface="+mn-lt"/>
                 <a:cs typeface="+mn-lt"/>
               </a:rPr>
@@ -15636,7 +15676,7 @@
               <a:t>. L'attributo </a:t>
             </a:r>
             <a:r>
-              <a:rPr lang="it-IT" sz="2400" i="1" err="1">
+              <a:rPr lang="it-IT" sz="2400" i="1" dirty="0" err="1">
                 <a:ea typeface="+mn-lt"/>
                 <a:cs typeface="+mn-lt"/>
               </a:rPr>
@@ -15650,7 +15690,7 @@
               <a:t> punta al descrittore di segmento successivo. I flag forniscono informazioni sulle pagine del segmento (es: </a:t>
             </a:r>
             <a:r>
-              <a:rPr lang="it-IT" sz="2400" err="1">
+              <a:rPr lang="it-IT" sz="2400" dirty="0" err="1">
                 <a:ea typeface="+mn-lt"/>
                 <a:cs typeface="+mn-lt"/>
               </a:rPr>
@@ -15664,7 +15704,7 @@
               <a:t> </a:t>
             </a:r>
             <a:r>
-              <a:rPr lang="it-IT" sz="2400" err="1">
+              <a:rPr lang="it-IT" sz="2400" dirty="0" err="1">
                 <a:ea typeface="+mn-lt"/>
                 <a:cs typeface="+mn-lt"/>
               </a:rPr>
@@ -15675,9 +15715,9 @@
                 <a:ea typeface="+mn-lt"/>
                 <a:cs typeface="+mn-lt"/>
               </a:rPr>
-              <a:t>, r/w)</a:t>
-            </a:r>
-            <a:endParaRPr lang="it-IT"/>
+              <a:t>, r/w).</a:t>
+            </a:r>
+            <a:endParaRPr lang="it-IT" dirty="0"/>
           </a:p>
           <a:p>
             <a:pPr marL="305435" indent="-305435"/>
@@ -16034,7 +16074,14 @@
               </a:rPr>
               <a:t>descriptor</a:t>
             </a:r>
-            <a:endParaRPr lang="it-IT" sz="2400" dirty="0" err="1"/>
+            <a:r>
+              <a:rPr lang="it-IT" sz="2400" dirty="0">
+                <a:ea typeface="+mn-lt"/>
+                <a:cs typeface="+mn-lt"/>
+              </a:rPr>
+              <a:t>.</a:t>
+            </a:r>
+            <a:endParaRPr lang="it-IT" sz="2400" dirty="0"/>
           </a:p>
         </p:txBody>
       </p:sp>
@@ -16300,7 +16347,7 @@
               <a:t>L'</a:t>
             </a:r>
             <a:r>
-              <a:rPr lang="it-IT" sz="2400" err="1">
+              <a:rPr lang="it-IT" sz="2400" dirty="0" err="1">
                 <a:ea typeface="+mn-lt"/>
                 <a:cs typeface="+mn-lt"/>
               </a:rPr>
@@ -16325,7 +16372,7 @@
               <a:t>Per fare ciò, il kernel utilizza la funzione </a:t>
             </a:r>
             <a:r>
-              <a:rPr lang="it-IT" sz="2400" i="1" err="1">
+              <a:rPr lang="it-IT" sz="2400" i="1" dirty="0" err="1">
                 <a:ea typeface="+mn-lt"/>
                 <a:cs typeface="+mn-lt"/>
               </a:rPr>
@@ -16339,7 +16386,7 @@
               <a:t> di </a:t>
             </a:r>
             <a:r>
-              <a:rPr lang="it-IT" sz="2400" i="1" err="1">
+              <a:rPr lang="it-IT" sz="2400" i="1" dirty="0" err="1">
                 <a:ea typeface="+mn-lt"/>
                 <a:cs typeface="+mn-lt"/>
               </a:rPr>
@@ -16353,7 +16400,7 @@
               <a:t> come </a:t>
             </a:r>
             <a:r>
-              <a:rPr lang="it-IT" sz="2400" err="1">
+              <a:rPr lang="it-IT" sz="2400" dirty="0" err="1">
                 <a:ea typeface="+mn-lt"/>
                 <a:cs typeface="+mn-lt"/>
               </a:rPr>
@@ -16367,7 +16414,7 @@
               <a:t> per </a:t>
             </a:r>
             <a:r>
-              <a:rPr lang="it-IT" sz="2400" i="1" err="1">
+              <a:rPr lang="it-IT" sz="2400" i="1" dirty="0" err="1">
                 <a:ea typeface="+mn-lt"/>
                 <a:cs typeface="+mn-lt"/>
               </a:rPr>
@@ -16381,7 +16428,7 @@
               <a:t>, in maniera simile a come </a:t>
             </a:r>
             <a:r>
-              <a:rPr lang="it-IT" sz="2400" err="1">
+              <a:rPr lang="it-IT" sz="2400" dirty="0" err="1">
                 <a:ea typeface="+mn-lt"/>
                 <a:cs typeface="+mn-lt"/>
               </a:rPr>
@@ -16395,7 +16442,7 @@
               <a:t> dello zone </a:t>
             </a:r>
             <a:r>
-              <a:rPr lang="it-IT" sz="2400" err="1">
+              <a:rPr lang="it-IT" sz="2400" dirty="0" err="1">
                 <a:ea typeface="+mn-lt"/>
                 <a:cs typeface="+mn-lt"/>
               </a:rPr>
@@ -16409,7 +16456,7 @@
               <a:t> richiama la </a:t>
             </a:r>
             <a:r>
-              <a:rPr lang="it-IT" sz="2400" err="1">
+              <a:rPr lang="it-IT" sz="2400" dirty="0" err="1">
                 <a:ea typeface="+mn-lt"/>
                 <a:cs typeface="+mn-lt"/>
               </a:rPr>
@@ -16799,10 +16846,6 @@
               </a:rPr>
               <a:t>). </a:t>
             </a:r>
-            <a:endParaRPr lang="it-IT" sz="2400">
-              <a:ea typeface="+mn-lt"/>
-              <a:cs typeface="+mn-lt"/>
-            </a:endParaRPr>
           </a:p>
           <a:p>
             <a:pPr marL="305435" indent="-305435"/>
@@ -16814,7 +16857,7 @@
               <a:t>Ciò richiederebbe la realizzazione di strutture dati opportune per tenere traccia delle liste di ordini dei blocchi. Queste potrebbero venire implementate mediante liste di </a:t>
             </a:r>
             <a:r>
-              <a:rPr lang="it-IT" sz="2400" err="1">
+              <a:rPr lang="it-IT" sz="2400" dirty="0" err="1">
                 <a:ea typeface="+mn-lt"/>
                 <a:cs typeface="+mn-lt"/>
               </a:rPr>
@@ -16828,7 +16871,7 @@
               <a:t> (le </a:t>
             </a:r>
             <a:r>
-              <a:rPr lang="it-IT" sz="2400" i="1" err="1">
+              <a:rPr lang="it-IT" sz="2400" i="1" dirty="0" err="1">
                 <a:ea typeface="+mn-lt"/>
                 <a:cs typeface="+mn-lt"/>
               </a:rPr>
@@ -16842,7 +16885,7 @@
               <a:t> di </a:t>
             </a:r>
             <a:r>
-              <a:rPr lang="it-IT" sz="2400" err="1">
+              <a:rPr lang="it-IT" sz="2400" dirty="0" err="1">
                 <a:ea typeface="+mn-lt"/>
                 <a:cs typeface="+mn-lt"/>
               </a:rPr>
@@ -16855,7 +16898,7 @@
               </a:rPr>
               <a:t>) aventi tra gli attributi l'ordine del blocco e il puntatore all'elemento successivo della lista. </a:t>
             </a:r>
-            <a:endParaRPr lang="it-IT"/>
+            <a:endParaRPr lang="it-IT" dirty="0"/>
           </a:p>
           <a:p>
             <a:pPr marL="305435" indent="-305435"/>
@@ -17223,7 +17266,7 @@
               <a:t>In OS161 di base non esiste nessun parallelo della </a:t>
             </a:r>
             <a:r>
-              <a:rPr lang="it-IT" sz="2400" err="1">
+              <a:rPr lang="it-IT" sz="2400" dirty="0" err="1">
                 <a:ea typeface="+mn-lt"/>
                 <a:cs typeface="+mn-lt"/>
               </a:rPr>
@@ -17237,7 +17280,7 @@
               <a:t> che si occupi del rilascio delle pagine occupate. Sarebbe quindi necessario implementare una funzione (es: </a:t>
             </a:r>
             <a:r>
-              <a:rPr lang="it-IT" sz="2400" i="1" err="1">
+              <a:rPr lang="it-IT" sz="2400" i="1" dirty="0" err="1">
                 <a:ea typeface="+mn-lt"/>
                 <a:cs typeface="+mn-lt"/>
               </a:rPr>
@@ -17251,7 +17294,7 @@
               <a:t>) che si occupi di rilasciare la memoria, seguendo l'algoritmo previsto dal </a:t>
             </a:r>
             <a:r>
-              <a:rPr lang="it-IT" sz="2400" err="1">
+              <a:rPr lang="it-IT" sz="2400" dirty="0" err="1">
                 <a:ea typeface="+mn-lt"/>
                 <a:cs typeface="+mn-lt"/>
               </a:rPr>
@@ -17265,7 +17308,7 @@
               <a:t> system (</a:t>
             </a:r>
             <a:r>
-              <a:rPr lang="it-IT" sz="2400" err="1">
+              <a:rPr lang="it-IT" sz="2400" dirty="0" err="1">
                 <a:ea typeface="+mn-lt"/>
                 <a:cs typeface="+mn-lt"/>
               </a:rPr>
@@ -17279,7 +17322,7 @@
               <a:t>. individuare il “</a:t>
             </a:r>
             <a:r>
-              <a:rPr lang="it-IT" sz="2400" err="1">
+              <a:rPr lang="it-IT" sz="2400" dirty="0" err="1">
                 <a:ea typeface="+mn-lt"/>
                 <a:cs typeface="+mn-lt"/>
               </a:rPr>
@@ -17292,10 +17335,6 @@
               </a:rPr>
               <a:t>” della memoria rilasciata, di ordine n ed effettuare il merge in un unico blocco di ordine n+1, se disponibile). </a:t>
             </a:r>
-            <a:endParaRPr lang="it-IT" sz="2400">
-              <a:ea typeface="+mn-lt"/>
-              <a:cs typeface="+mn-lt"/>
-            </a:endParaRPr>
           </a:p>
           <a:p>
             <a:pPr marL="305435" indent="-305435"/>
@@ -17478,7 +17517,7 @@
               </a:rPr>
               <a:t>Sarebbe inoltre necessaria una struttura “parallela” alle liste di blocchi liberi, che tenga invece traccia di quelli allocati. </a:t>
             </a:r>
-            <a:endParaRPr lang="it-IT"/>
+            <a:endParaRPr lang="it-IT" dirty="0"/>
           </a:p>
         </p:txBody>
       </p:sp>
@@ -17563,7 +17602,7 @@
           <a:p>
             <a:pPr marL="305435" indent="-305435"/>
             <a:r>
-              <a:rPr lang="it-IT" sz="2400" err="1">
+              <a:rPr lang="it-IT" sz="2400" dirty="0" err="1">
                 <a:ea typeface="+mn-lt"/>
                 <a:cs typeface="+mn-lt"/>
               </a:rPr>
@@ -17588,7 +17627,7 @@
               <a:t>8 General-</a:t>
             </a:r>
             <a:r>
-              <a:rPr lang="it-IT" sz="2200" err="1">
+              <a:rPr lang="it-IT" sz="2200" dirty="0" err="1">
                 <a:ea typeface="+mn-lt"/>
                 <a:cs typeface="+mn-lt"/>
               </a:rPr>
@@ -17602,7 +17641,7 @@
               <a:t> Data </a:t>
             </a:r>
             <a:r>
-              <a:rPr lang="it-IT" sz="2200" err="1">
+              <a:rPr lang="it-IT" sz="2200" dirty="0" err="1">
                 <a:ea typeface="+mn-lt"/>
                 <a:cs typeface="+mn-lt"/>
               </a:rPr>
@@ -17613,9 +17652,9 @@
                 <a:ea typeface="+mn-lt"/>
                 <a:cs typeface="+mn-lt"/>
               </a:rPr>
-              <a:t> a 32 bit</a:t>
-            </a:r>
-            <a:endParaRPr lang="it-IT" sz="2200"/>
+              <a:t> a 32 bit;</a:t>
+            </a:r>
+            <a:endParaRPr lang="it-IT" sz="2200" dirty="0"/>
           </a:p>
           <a:p>
             <a:pPr marL="629920" lvl="1" indent="-305435"/>
@@ -17627,7 +17666,7 @@
               <a:t>6 </a:t>
             </a:r>
             <a:r>
-              <a:rPr lang="it-IT" sz="2200" err="1">
+              <a:rPr lang="it-IT" sz="2200" dirty="0" err="1">
                 <a:ea typeface="+mn-lt"/>
                 <a:cs typeface="+mn-lt"/>
               </a:rPr>
@@ -17641,7 +17680,7 @@
               <a:t> </a:t>
             </a:r>
             <a:r>
-              <a:rPr lang="it-IT" sz="2200" err="1">
+              <a:rPr lang="it-IT" sz="2200" dirty="0" err="1">
                 <a:ea typeface="+mn-lt"/>
                 <a:cs typeface="+mn-lt"/>
               </a:rPr>
@@ -17652,9 +17691,9 @@
                 <a:ea typeface="+mn-lt"/>
                 <a:cs typeface="+mn-lt"/>
               </a:rPr>
-              <a:t> a 16 bit</a:t>
-            </a:r>
-            <a:endParaRPr lang="it-IT" sz="2200"/>
+              <a:t> a 16 bit;</a:t>
+            </a:r>
+            <a:endParaRPr lang="it-IT" sz="2200" dirty="0"/>
           </a:p>
           <a:p>
             <a:pPr marL="629920" lvl="1" indent="-305435"/>
@@ -17666,7 +17705,7 @@
               <a:t>2 Status e Control </a:t>
             </a:r>
             <a:r>
-              <a:rPr lang="it-IT" sz="2200" err="1">
+              <a:rPr lang="it-IT" sz="2200" dirty="0" err="1">
                 <a:ea typeface="+mn-lt"/>
                 <a:cs typeface="+mn-lt"/>
               </a:rPr>
@@ -17680,7 +17719,7 @@
               <a:t> a 32 bit (1 che funge da </a:t>
             </a:r>
             <a:r>
-              <a:rPr lang="it-IT" sz="2200" err="1">
+              <a:rPr lang="it-IT" sz="2200" dirty="0" err="1">
                 <a:ea typeface="+mn-lt"/>
                 <a:cs typeface="+mn-lt"/>
               </a:rPr>
@@ -17691,9 +17730,9 @@
                 <a:ea typeface="+mn-lt"/>
                 <a:cs typeface="+mn-lt"/>
               </a:rPr>
-              <a:t> counter e 1 che mantiene una serie di flag di controllo per il sistema)</a:t>
-            </a:r>
-            <a:endParaRPr lang="it-IT" sz="2200"/>
+              <a:t> counter e 1 che mantiene una serie di flag di controllo per il sistema).</a:t>
+            </a:r>
+            <a:endParaRPr lang="it-IT" sz="2200" dirty="0"/>
           </a:p>
         </p:txBody>
       </p:sp>
@@ -18003,10 +18042,6 @@
               </a:rPr>
               <a:t> (ovviamente a patto di volere un codice comprensibile e mantenibile). </a:t>
             </a:r>
-            <a:endParaRPr lang="it-IT" sz="2400">
-              <a:ea typeface="+mn-lt"/>
-              <a:cs typeface="+mn-lt"/>
-            </a:endParaRPr>
           </a:p>
           <a:p>
             <a:pPr marL="305435" indent="-305435"/>
@@ -18071,7 +18106,7 @@
                 <a:ea typeface="+mn-lt"/>
                 <a:cs typeface="+mn-lt"/>
               </a:rPr>
-              <a:t>)</a:t>
+              <a:t>).</a:t>
             </a:r>
             <a:endParaRPr lang="it-IT" dirty="0"/>
           </a:p>
@@ -18194,52 +18229,160 @@
                 <a:ea typeface="+mn-lt"/>
                 <a:cs typeface="+mn-lt"/>
               </a:rPr>
-              <a:t> del TLB con sostituzione, il </a:t>
+              <a:t> del TLB con sostituzione, il ché significa che una volta riempite tutte le entry del TLB il kernel andrà in crash. </a:t>
+            </a:r>
+          </a:p>
+          <a:p>
+            <a:pPr marL="305435" indent="-305435"/>
+            <a:r>
+              <a:rPr lang="it-IT" sz="2400" dirty="0">
+                <a:ea typeface="+mn-lt"/>
+                <a:cs typeface="+mn-lt"/>
+              </a:rPr>
+              <a:t>Questo perché al momento il gestore dei fault del TLB, </a:t>
+            </a:r>
+            <a:r>
+              <a:rPr lang="it-IT" sz="2400" i="1" dirty="0" err="1">
+                <a:ea typeface="+mn-lt"/>
+                <a:cs typeface="+mn-lt"/>
+              </a:rPr>
+              <a:t>vm_fault</a:t>
+            </a:r>
+            <a:r>
+              <a:rPr lang="it-IT" sz="2400" dirty="0">
+                <a:ea typeface="+mn-lt"/>
+                <a:cs typeface="+mn-lt"/>
+              </a:rPr>
+              <a:t> (in </a:t>
+            </a:r>
+            <a:r>
+              <a:rPr lang="it-IT" sz="2400" i="1" dirty="0" err="1">
+                <a:ea typeface="+mn-lt"/>
+                <a:cs typeface="+mn-lt"/>
+              </a:rPr>
+              <a:t>kern</a:t>
+            </a:r>
+            <a:r>
+              <a:rPr lang="it-IT" sz="2400" i="1" dirty="0">
+                <a:ea typeface="+mn-lt"/>
+                <a:cs typeface="+mn-lt"/>
+              </a:rPr>
+              <a:t>/</a:t>
+            </a:r>
+            <a:r>
+              <a:rPr lang="it-IT" sz="2400" i="1" dirty="0" err="1">
+                <a:ea typeface="+mn-lt"/>
+                <a:cs typeface="+mn-lt"/>
+              </a:rPr>
+              <a:t>arch</a:t>
+            </a:r>
+            <a:r>
+              <a:rPr lang="it-IT" sz="2400" i="1" dirty="0">
+                <a:ea typeface="+mn-lt"/>
+                <a:cs typeface="+mn-lt"/>
+              </a:rPr>
+              <a:t>/</a:t>
+            </a:r>
+            <a:r>
+              <a:rPr lang="it-IT" sz="2400" i="1" dirty="0" err="1">
+                <a:ea typeface="+mn-lt"/>
+                <a:cs typeface="+mn-lt"/>
+              </a:rPr>
+              <a:t>mips</a:t>
+            </a:r>
+            <a:r>
+              <a:rPr lang="it-IT" sz="2400" i="1" dirty="0">
+                <a:ea typeface="+mn-lt"/>
+                <a:cs typeface="+mn-lt"/>
+              </a:rPr>
+              <a:t>/</a:t>
+            </a:r>
+            <a:r>
+              <a:rPr lang="it-IT" sz="2400" i="1" dirty="0" err="1">
+                <a:ea typeface="+mn-lt"/>
+                <a:cs typeface="+mn-lt"/>
+              </a:rPr>
+              <a:t>vm</a:t>
+            </a:r>
+            <a:r>
+              <a:rPr lang="it-IT" sz="2400" i="1" dirty="0">
+                <a:ea typeface="+mn-lt"/>
+                <a:cs typeface="+mn-lt"/>
+              </a:rPr>
+              <a:t>/</a:t>
+            </a:r>
+            <a:r>
+              <a:rPr lang="it-IT" sz="2400" i="1" dirty="0" err="1">
+                <a:ea typeface="+mn-lt"/>
+                <a:cs typeface="+mn-lt"/>
+              </a:rPr>
+              <a:t>dumbvm</a:t>
             </a:r>
             <a:r>
               <a:rPr lang="it-IT" sz="2400" dirty="0" err="1">
                 <a:ea typeface="+mn-lt"/>
                 <a:cs typeface="+mn-lt"/>
               </a:rPr>
-              <a:t>ché</a:t>
-            </a:r>
-            <a:r>
-              <a:rPr lang="it-IT" sz="2400" dirty="0">
-                <a:ea typeface="+mn-lt"/>
-                <a:cs typeface="+mn-lt"/>
-              </a:rPr>
-              <a:t> significa che una volta riempite tutte le entry del TLB il kernel andrà in crash. </a:t>
-            </a:r>
-            <a:endParaRPr lang="it-IT" sz="2400">
-              <a:ea typeface="+mn-lt"/>
-              <a:cs typeface="+mn-lt"/>
-            </a:endParaRPr>
-          </a:p>
-          <a:p>
-            <a:pPr marL="305435" indent="-305435"/>
-            <a:r>
-              <a:rPr lang="it-IT" sz="2400" dirty="0">
-                <a:ea typeface="+mn-lt"/>
-                <a:cs typeface="+mn-lt"/>
-              </a:rPr>
-              <a:t>Questo perché al momento il gestore dei fault del TLB, </a:t>
-            </a:r>
-            <a:r>
-              <a:rPr lang="it-IT" sz="2400" i="1" err="1">
-                <a:ea typeface="+mn-lt"/>
-                <a:cs typeface="+mn-lt"/>
-              </a:rPr>
-              <a:t>vm_fault</a:t>
-            </a:r>
-            <a:r>
-              <a:rPr lang="it-IT" sz="2400" dirty="0">
-                <a:ea typeface="+mn-lt"/>
-                <a:cs typeface="+mn-lt"/>
-              </a:rPr>
-              <a:t> (in </a:t>
-            </a:r>
-            <a:r>
-              <a:rPr lang="it-IT" sz="2400" i="1" err="1">
+              <a:t>.c</a:t>
+            </a:r>
+            <a:r>
+              <a:rPr lang="it-IT" sz="2400" dirty="0">
+                <a:ea typeface="+mn-lt"/>
+                <a:cs typeface="+mn-lt"/>
+              </a:rPr>
+              <a:t>) non gestisce effettivamente i casi possibili (fault su entry in sola scrittura o r/w), ma si limita a cercare la prima entry libera del TLB e nel caso in cui non la trovi, restituisce un valore di errore alla funzione chiamante, ovvero </a:t>
+            </a:r>
+            <a:r>
+              <a:rPr lang="it-IT" sz="2400" i="1" dirty="0" err="1">
+                <a:ea typeface="+mn-lt"/>
+                <a:cs typeface="+mn-lt"/>
+              </a:rPr>
+              <a:t>mips_trap</a:t>
+            </a:r>
+            <a:r>
+              <a:rPr lang="it-IT" sz="2400" i="1" dirty="0">
+                <a:ea typeface="+mn-lt"/>
+                <a:cs typeface="+mn-lt"/>
+              </a:rPr>
+              <a:t>,</a:t>
+            </a:r>
+            <a:r>
+              <a:rPr lang="it-IT" sz="2400" dirty="0">
+                <a:ea typeface="+mn-lt"/>
+                <a:cs typeface="+mn-lt"/>
+              </a:rPr>
+              <a:t> l'</a:t>
+            </a:r>
+            <a:r>
+              <a:rPr lang="it-IT" sz="2400" dirty="0" err="1">
+                <a:ea typeface="+mn-lt"/>
+                <a:cs typeface="+mn-lt"/>
+              </a:rPr>
+              <a:t>exception</a:t>
+            </a:r>
+            <a:r>
+              <a:rPr lang="it-IT" sz="2400" dirty="0">
+                <a:ea typeface="+mn-lt"/>
+                <a:cs typeface="+mn-lt"/>
+              </a:rPr>
+              <a:t>/trap </a:t>
+            </a:r>
+            <a:r>
+              <a:rPr lang="it-IT" sz="2400" dirty="0" err="1">
+                <a:ea typeface="+mn-lt"/>
+                <a:cs typeface="+mn-lt"/>
+              </a:rPr>
+              <a:t>handler</a:t>
+            </a:r>
+            <a:r>
+              <a:rPr lang="it-IT" sz="2400" dirty="0">
+                <a:ea typeface="+mn-lt"/>
+                <a:cs typeface="+mn-lt"/>
+              </a:rPr>
+              <a:t> di OS16 (sito in </a:t>
+            </a:r>
+            <a:r>
+              <a:rPr lang="it-IT" sz="2400" i="1" dirty="0" err="1">
                 <a:ea typeface="+mn-lt"/>
                 <a:cs typeface="+mn-lt"/>
               </a:rPr>
@@ -18253,7 +18396,7 @@
               <a:t>/</a:t>
             </a:r>
             <a:r>
-              <a:rPr lang="it-IT" sz="2400" i="1" err="1">
+              <a:rPr lang="it-IT" sz="2400" i="1" dirty="0" err="1">
                 <a:ea typeface="+mn-lt"/>
                 <a:cs typeface="+mn-lt"/>
               </a:rPr>
@@ -18267,7 +18410,7 @@
               <a:t>/</a:t>
             </a:r>
             <a:r>
-              <a:rPr lang="it-IT" sz="2400" i="1" err="1">
+              <a:rPr lang="it-IT" sz="2400" i="1" dirty="0" err="1">
                 <a:ea typeface="+mn-lt"/>
                 <a:cs typeface="+mn-lt"/>
               </a:rPr>
@@ -18281,11 +18424,11 @@
               <a:t>/</a:t>
             </a:r>
             <a:r>
-              <a:rPr lang="it-IT" sz="2400" i="1" err="1">
-                <a:ea typeface="+mn-lt"/>
-                <a:cs typeface="+mn-lt"/>
-              </a:rPr>
-              <a:t>vm</a:t>
+              <a:rPr lang="it-IT" sz="2400" i="1" dirty="0" err="1">
+                <a:ea typeface="+mn-lt"/>
+                <a:cs typeface="+mn-lt"/>
+              </a:rPr>
+              <a:t>locore</a:t>
             </a:r>
             <a:r>
               <a:rPr lang="it-IT" sz="2400" i="1" dirty="0">
@@ -18295,14 +18438,14 @@
               <a:t>/</a:t>
             </a:r>
             <a:r>
-              <a:rPr lang="it-IT" sz="2400" i="1" err="1">
-                <a:ea typeface="+mn-lt"/>
-                <a:cs typeface="+mn-lt"/>
-              </a:rPr>
-              <a:t>dumbvm</a:t>
-            </a:r>
-            <a:r>
-              <a:rPr lang="it-IT" sz="2400" err="1">
+              <a:rPr lang="it-IT" sz="2400" i="1" dirty="0" err="1">
+                <a:ea typeface="+mn-lt"/>
+                <a:cs typeface="+mn-lt"/>
+              </a:rPr>
+              <a:t>trap</a:t>
+            </a:r>
+            <a:r>
+              <a:rPr lang="it-IT" sz="2400" dirty="0" err="1">
                 <a:ea typeface="+mn-lt"/>
                 <a:cs typeface="+mn-lt"/>
               </a:rPr>
@@ -18313,147 +18456,7 @@
                 <a:ea typeface="+mn-lt"/>
                 <a:cs typeface="+mn-lt"/>
               </a:rPr>
-              <a:t>) non gestisce effettivamente i casi possibili (fault su entry in sola scrittura o r/w) ma si limita a cercare la prima entry libera del </a:t>
-            </a:r>
-            <a:r>
-              <a:rPr lang="it-IT" sz="2400" err="1">
-                <a:ea typeface="+mn-lt"/>
-                <a:cs typeface="+mn-lt"/>
-              </a:rPr>
-              <a:t>tlb</a:t>
-            </a:r>
-            <a:r>
-              <a:rPr lang="it-IT" sz="2400" dirty="0">
-                <a:ea typeface="+mn-lt"/>
-                <a:cs typeface="+mn-lt"/>
-              </a:rPr>
-              <a:t> e nel caso in cui non la trovi, restituisce un valore di errore alla funzione chiamante, ovvero </a:t>
-            </a:r>
-            <a:r>
-              <a:rPr lang="it-IT" sz="2400" i="1" err="1">
-                <a:ea typeface="+mn-lt"/>
-                <a:cs typeface="+mn-lt"/>
-              </a:rPr>
-              <a:t>mips_trap</a:t>
-            </a:r>
-            <a:r>
-              <a:rPr lang="it-IT" sz="2400" i="1" dirty="0">
-                <a:ea typeface="+mn-lt"/>
-                <a:cs typeface="+mn-lt"/>
-              </a:rPr>
-              <a:t>,</a:t>
-            </a:r>
-            <a:r>
-              <a:rPr lang="it-IT" sz="2400" dirty="0">
-                <a:ea typeface="+mn-lt"/>
-                <a:cs typeface="+mn-lt"/>
-              </a:rPr>
-              <a:t> l'</a:t>
-            </a:r>
-            <a:r>
-              <a:rPr lang="it-IT" sz="2400" err="1">
-                <a:ea typeface="+mn-lt"/>
-                <a:cs typeface="+mn-lt"/>
-              </a:rPr>
-              <a:t>exception</a:t>
-            </a:r>
-            <a:r>
-              <a:rPr lang="it-IT" sz="2400" dirty="0">
-                <a:ea typeface="+mn-lt"/>
-                <a:cs typeface="+mn-lt"/>
-              </a:rPr>
-              <a:t>/trap </a:t>
-            </a:r>
-            <a:r>
-              <a:rPr lang="it-IT" sz="2400" err="1">
-                <a:ea typeface="+mn-lt"/>
-                <a:cs typeface="+mn-lt"/>
-              </a:rPr>
-              <a:t>handler</a:t>
-            </a:r>
-            <a:r>
-              <a:rPr lang="it-IT" sz="2400" dirty="0">
-                <a:ea typeface="+mn-lt"/>
-                <a:cs typeface="+mn-lt"/>
-              </a:rPr>
-              <a:t> di OS16 (sito in </a:t>
-            </a:r>
-            <a:r>
-              <a:rPr lang="it-IT" sz="2400" i="1" err="1">
-                <a:ea typeface="+mn-lt"/>
-                <a:cs typeface="+mn-lt"/>
-              </a:rPr>
-              <a:t>kern</a:t>
-            </a:r>
-            <a:r>
-              <a:rPr lang="it-IT" sz="2400" i="1" dirty="0">
-                <a:ea typeface="+mn-lt"/>
-                <a:cs typeface="+mn-lt"/>
-              </a:rPr>
-              <a:t>/</a:t>
-            </a:r>
-            <a:r>
-              <a:rPr lang="it-IT" sz="2400" i="1" err="1">
-                <a:ea typeface="+mn-lt"/>
-                <a:cs typeface="+mn-lt"/>
-              </a:rPr>
-              <a:t>arch</a:t>
-            </a:r>
-            <a:r>
-              <a:rPr lang="it-IT" sz="2400" i="1" dirty="0">
-                <a:ea typeface="+mn-lt"/>
-                <a:cs typeface="+mn-lt"/>
-              </a:rPr>
-              <a:t>/</a:t>
-            </a:r>
-            <a:r>
-              <a:rPr lang="it-IT" sz="2400" i="1" err="1">
-                <a:ea typeface="+mn-lt"/>
-                <a:cs typeface="+mn-lt"/>
-              </a:rPr>
-              <a:t>mips</a:t>
-            </a:r>
-            <a:r>
-              <a:rPr lang="it-IT" sz="2400" i="1" dirty="0">
-                <a:ea typeface="+mn-lt"/>
-                <a:cs typeface="+mn-lt"/>
-              </a:rPr>
-              <a:t>/</a:t>
-            </a:r>
-            <a:r>
-              <a:rPr lang="it-IT" sz="2400" i="1" err="1">
-                <a:ea typeface="+mn-lt"/>
-                <a:cs typeface="+mn-lt"/>
-              </a:rPr>
-              <a:t>locore</a:t>
-            </a:r>
-            <a:r>
-              <a:rPr lang="it-IT" sz="2400" i="1" dirty="0">
-                <a:ea typeface="+mn-lt"/>
-                <a:cs typeface="+mn-lt"/>
-              </a:rPr>
-              <a:t>/</a:t>
-            </a:r>
-            <a:r>
-              <a:rPr lang="it-IT" sz="2400" i="1" err="1">
-                <a:ea typeface="+mn-lt"/>
-                <a:cs typeface="+mn-lt"/>
-              </a:rPr>
-              <a:t>trap</a:t>
-            </a:r>
-            <a:r>
-              <a:rPr lang="it-IT" sz="2400" err="1">
-                <a:ea typeface="+mn-lt"/>
-                <a:cs typeface="+mn-lt"/>
-              </a:rPr>
-              <a:t>.c</a:t>
-            </a:r>
-            <a:r>
-              <a:rPr lang="it-IT" sz="2400" dirty="0">
-                <a:ea typeface="+mn-lt"/>
-                <a:cs typeface="+mn-lt"/>
-              </a:rPr>
-              <a:t>)</a:t>
+              <a:t>).</a:t>
             </a:r>
             <a:endParaRPr lang="it-IT" dirty="0"/>
           </a:p>
@@ -18770,7 +18773,7 @@
                 <a:ea typeface="+mn-lt"/>
                 <a:cs typeface="+mn-lt"/>
               </a:rPr>
-              <a:t>tlb.h</a:t>
+              <a:t>TLB.h</a:t>
             </a:r>
             <a:r>
               <a:rPr lang="it-IT" sz="2400" dirty="0">
@@ -18783,88 +18786,74 @@
           <a:p>
             <a:pPr marL="629920" lvl="1" indent="-305435"/>
             <a:r>
-              <a:rPr lang="it-IT" sz="2200" i="1" err="1">
-                <a:ea typeface="+mn-lt"/>
-                <a:cs typeface="+mn-lt"/>
-              </a:rPr>
-              <a:t>tlb_random</a:t>
+              <a:rPr lang="it-IT" sz="2200" i="1" dirty="0" err="1">
+                <a:ea typeface="+mn-lt"/>
+                <a:cs typeface="+mn-lt"/>
+              </a:rPr>
+              <a:t>TLB_random</a:t>
             </a:r>
             <a:r>
               <a:rPr lang="it-IT" sz="2200" dirty="0">
                 <a:ea typeface="+mn-lt"/>
                 <a:cs typeface="+mn-lt"/>
               </a:rPr>
-              <a:t>: scrive la entry passata come parametri (HI e LOW) in uno slot del TLB scelto a (pseudo)random dalla CPU</a:t>
-            </a:r>
-            <a:endParaRPr lang="it-IT" sz="2200"/>
+              <a:t>: scrive la entry passata come parametri (HI e LOW) in uno slot del TLB scelto a (pseudo)random dalla CPU;</a:t>
+            </a:r>
+            <a:endParaRPr lang="it-IT" sz="2200" dirty="0"/>
           </a:p>
           <a:p>
             <a:pPr marL="629920" lvl="1" indent="-305435"/>
             <a:r>
-              <a:rPr lang="it-IT" sz="2200" i="1" err="1">
-                <a:ea typeface="+mn-lt"/>
-                <a:cs typeface="+mn-lt"/>
-              </a:rPr>
-              <a:t>tlb_write</a:t>
+              <a:rPr lang="it-IT" sz="2200" i="1" dirty="0" err="1">
+                <a:ea typeface="+mn-lt"/>
+                <a:cs typeface="+mn-lt"/>
+              </a:rPr>
+              <a:t>TLB_write</a:t>
             </a:r>
             <a:r>
               <a:rPr lang="it-IT" sz="2200" dirty="0">
                 <a:ea typeface="+mn-lt"/>
                 <a:cs typeface="+mn-lt"/>
               </a:rPr>
-              <a:t>: come la random, ma lo slot in cui scrivere viene specificato</a:t>
-            </a:r>
-            <a:endParaRPr lang="it-IT"/>
+              <a:t>: come la random, ma lo slot in cui scrivere viene specificato;</a:t>
+            </a:r>
+            <a:endParaRPr lang="it-IT" dirty="0"/>
           </a:p>
           <a:p>
             <a:pPr marL="629920" lvl="1" indent="-305435"/>
             <a:r>
-              <a:rPr lang="it-IT" sz="2200" i="1" err="1">
-                <a:ea typeface="+mn-lt"/>
-                <a:cs typeface="+mn-lt"/>
-              </a:rPr>
-              <a:t>tlb_read</a:t>
+              <a:rPr lang="it-IT" sz="2200" i="1" dirty="0" err="1">
+                <a:ea typeface="+mn-lt"/>
+                <a:cs typeface="+mn-lt"/>
+              </a:rPr>
+              <a:t>TLB_read</a:t>
             </a:r>
             <a:r>
               <a:rPr lang="it-IT" sz="2200" dirty="0">
                 <a:ea typeface="+mn-lt"/>
                 <a:cs typeface="+mn-lt"/>
               </a:rPr>
-              <a:t>: salva il valore della entry </a:t>
-            </a:r>
-            <a:r>
-              <a:rPr lang="it-IT" sz="2200" err="1">
-                <a:ea typeface="+mn-lt"/>
-                <a:cs typeface="+mn-lt"/>
-              </a:rPr>
-              <a:t>tlb</a:t>
+              <a:t>: salva il valore della entry TLB specificata nei parametri passati;</a:t>
+            </a:r>
+            <a:endParaRPr lang="it-IT" dirty="0"/>
+          </a:p>
+          <a:p>
+            <a:pPr marL="629920" lvl="1" indent="-305435"/>
+            <a:r>
+              <a:rPr lang="it-IT" sz="2200" i="1" dirty="0" err="1">
+                <a:ea typeface="+mn-lt"/>
+                <a:cs typeface="+mn-lt"/>
+              </a:rPr>
+              <a:t>TLB_probe</a:t>
             </a:r>
             <a:r>
               <a:rPr lang="it-IT" sz="2200" dirty="0">
                 <a:ea typeface="+mn-lt"/>
                 <a:cs typeface="+mn-lt"/>
               </a:rPr>
-              <a:t> specificata nei parametri passati</a:t>
-            </a:r>
-            <a:endParaRPr lang="it-IT"/>
-          </a:p>
-          <a:p>
-            <a:pPr marL="629920" lvl="1" indent="-305435"/>
-            <a:r>
-              <a:rPr lang="it-IT" sz="2200" i="1" err="1">
-                <a:ea typeface="+mn-lt"/>
-                <a:cs typeface="+mn-lt"/>
-              </a:rPr>
-              <a:t>tlb_probe</a:t>
-            </a:r>
-            <a:r>
-              <a:rPr lang="it-IT" sz="2200" dirty="0">
-                <a:ea typeface="+mn-lt"/>
-                <a:cs typeface="+mn-lt"/>
-              </a:rPr>
-              <a:t>: cerca una entry corrispondente al valore passato. Se questa non viene trovata, restituisce un valore negativo, altrimenti ritorna la posizione nel TLB della entry</a:t>
-            </a:r>
-            <a:endParaRPr lang="it-IT" sz="2200"/>
+              <a:t>: cerca una entry corrispondente al valore passato. Se questa non viene trovata, restituisce un valore negativo, altrimenti ritorna la posizione nel TLB della entry.</a:t>
+            </a:r>
+            <a:endParaRPr lang="it-IT" sz="2200" dirty="0"/>
           </a:p>
           <a:p>
             <a:pPr marL="305435" indent="-305435"/>
@@ -18876,7 +18865,7 @@
               <a:t>Sono funzioni assembly (</a:t>
             </a:r>
             <a:r>
-              <a:rPr lang="it-IT" sz="2400" i="1" err="1">
+              <a:rPr lang="it-IT" sz="2400" i="1" dirty="0" err="1">
                 <a:ea typeface="+mn-lt"/>
                 <a:cs typeface="+mn-lt"/>
               </a:rPr>
@@ -18890,7 +18879,7 @@
               <a:t>/</a:t>
             </a:r>
             <a:r>
-              <a:rPr lang="it-IT" sz="2400" i="1" err="1">
+              <a:rPr lang="it-IT" sz="2400" i="1" dirty="0" err="1">
                 <a:ea typeface="+mn-lt"/>
                 <a:cs typeface="+mn-lt"/>
               </a:rPr>
@@ -18904,7 +18893,7 @@
               <a:t>/</a:t>
             </a:r>
             <a:r>
-              <a:rPr lang="it-IT" sz="2400" i="1" err="1">
+              <a:rPr lang="it-IT" sz="2400" i="1" dirty="0" err="1">
                 <a:ea typeface="+mn-lt"/>
                 <a:cs typeface="+mn-lt"/>
               </a:rPr>
@@ -18918,7 +18907,7 @@
               <a:t>/</a:t>
             </a:r>
             <a:r>
-              <a:rPr lang="it-IT" sz="2400" i="1" err="1">
+              <a:rPr lang="it-IT" sz="2400" i="1" dirty="0" err="1">
                 <a:ea typeface="+mn-lt"/>
                 <a:cs typeface="+mn-lt"/>
               </a:rPr>
@@ -18929,7 +18918,7 @@
                 <a:ea typeface="+mn-lt"/>
                 <a:cs typeface="+mn-lt"/>
               </a:rPr>
-              <a:t>/tlb-mips161</a:t>
+              <a:t>/TLB-mips161</a:t>
             </a:r>
             <a:r>
               <a:rPr lang="it-IT" sz="2400" dirty="0">
@@ -18938,7 +18927,7 @@
               </a:rPr>
               <a:t>.S)  e quindi architettura-dipendenti. Fortunatamente sono sufficienti per gestire appieno il TLB, bisogna però implementare la loro chiamata. </a:t>
             </a:r>
-            <a:endParaRPr lang="it-IT"/>
+            <a:endParaRPr lang="it-IT" dirty="0"/>
           </a:p>
         </p:txBody>
       </p:sp>
@@ -19235,7 +19224,7 @@
               <a:t>VM_FAULT_READONLY: eccezione per TLB </a:t>
             </a:r>
             <a:r>
-              <a:rPr lang="it-IT" sz="2200" err="1">
+              <a:rPr lang="it-IT" sz="2200" dirty="0" err="1">
                 <a:ea typeface="+mn-lt"/>
                 <a:cs typeface="+mn-lt"/>
               </a:rPr>
@@ -19249,7 +19238,7 @@
               <a:t> su una pagina </a:t>
             </a:r>
             <a:r>
-              <a:rPr lang="it-IT" sz="2200" err="1">
+              <a:rPr lang="it-IT" sz="2200" dirty="0" err="1">
                 <a:ea typeface="+mn-lt"/>
                 <a:cs typeface="+mn-lt"/>
               </a:rPr>
@@ -19263,7 +19252,7 @@
               <a:t>. Non dovrebbe mai accadere, effettuiamo la </a:t>
             </a:r>
             <a:r>
-              <a:rPr lang="it-IT" sz="2200" err="1">
+              <a:rPr lang="it-IT" sz="2200" dirty="0" err="1">
                 <a:ea typeface="+mn-lt"/>
                 <a:cs typeface="+mn-lt"/>
               </a:rPr>
@@ -19274,9 +19263,9 @@
                 <a:ea typeface="+mn-lt"/>
                 <a:cs typeface="+mn-lt"/>
               </a:rPr>
-              <a:t> del processo richiedente.</a:t>
-            </a:r>
-            <a:endParaRPr lang="it-IT" sz="2200"/>
+              <a:t> del processo richiedente;</a:t>
+            </a:r>
+            <a:endParaRPr lang="it-IT" sz="2200" dirty="0"/>
           </a:p>
           <a:p>
             <a:pPr marL="629920" lvl="1" indent="-305435"/>
@@ -19299,58 +19288,40 @@
                 <a:ea typeface="+mn-lt"/>
                 <a:cs typeface="+mn-lt"/>
               </a:rPr>
-              <a:t> per inserirla. Con la pagina in memoria, si aggiorna l'entry del </a:t>
-            </a:r>
-            <a:r>
-              <a:rPr lang="it-IT" sz="2200" err="1">
-                <a:ea typeface="+mn-lt"/>
-                <a:cs typeface="+mn-lt"/>
-              </a:rPr>
-              <a:t>tlb</a:t>
+              <a:t> per inserirla. Con la pagina in memoria, si aggiorna l'entry del TLB con il nuovo frame. In caso di TLB pieno, si può sovrascrivere una entry con </a:t>
+            </a:r>
+            <a:r>
+              <a:rPr lang="it-IT" sz="2200" i="1" dirty="0" err="1">
+                <a:ea typeface="+mn-lt"/>
+                <a:cs typeface="+mn-lt"/>
+              </a:rPr>
+              <a:t>TLB_random</a:t>
             </a:r>
             <a:r>
               <a:rPr lang="it-IT" sz="2200" dirty="0">
                 <a:ea typeface="+mn-lt"/>
                 <a:cs typeface="+mn-lt"/>
               </a:rPr>
-              <a:t> con il nuovo frame. In caso di TLB pieno, si può sovrascrivere una entry con </a:t>
-            </a:r>
-            <a:r>
-              <a:rPr lang="it-IT" sz="2200" i="1" err="1">
-                <a:ea typeface="+mn-lt"/>
-                <a:cs typeface="+mn-lt"/>
-              </a:rPr>
-              <a:t>tlb_random</a:t>
+              <a:t>, oppure adottare algoritmi più sofisticati (magari basati sulla località) in combinazione con </a:t>
+            </a:r>
+            <a:r>
+              <a:rPr lang="it-IT" sz="2200" i="1" dirty="0" err="1">
+                <a:ea typeface="+mn-lt"/>
+                <a:cs typeface="+mn-lt"/>
+              </a:rPr>
+              <a:t>TLB_write</a:t>
             </a:r>
             <a:r>
               <a:rPr lang="it-IT" sz="2200" dirty="0">
                 <a:ea typeface="+mn-lt"/>
                 <a:cs typeface="+mn-lt"/>
               </a:rPr>
-              <a:t>, oppure adottare algoritmi più sofisticati (magari basati sulla località) in combinazione con </a:t>
-            </a:r>
-            <a:r>
-              <a:rPr lang="it-IT" sz="2200" i="1" err="1">
-                <a:ea typeface="+mn-lt"/>
-                <a:cs typeface="+mn-lt"/>
-              </a:rPr>
-              <a:t>tlb_write</a:t>
-            </a:r>
-            <a:r>
-              <a:rPr lang="it-IT" sz="2200" dirty="0">
-                <a:ea typeface="+mn-lt"/>
-                <a:cs typeface="+mn-lt"/>
-              </a:rPr>
               <a:t>, per selezionare e sovrascrivere la pagina vittima.</a:t>
             </a:r>
-            <a:endParaRPr lang="it-IT" sz="2200">
-              <a:ea typeface="+mn-lt"/>
-              <a:cs typeface="+mn-lt"/>
-            </a:endParaRPr>
           </a:p>
           <a:p>
             <a:pPr marL="305435" indent="-305435"/>
-            <a:endParaRPr lang="it-IT"/>
+            <a:endParaRPr lang="it-IT" dirty="0"/>
           </a:p>
           <a:p>
             <a:pPr marL="305435" indent="-305435"/>
@@ -19620,7 +19591,7 @@
                 <a:ea typeface="+mn-lt"/>
                 <a:cs typeface="+mn-lt"/>
               </a:rPr>
-              <a:t>In ogni caso bisogna sempre controllare la validità dell'indirizzo a cui si tenta di fare accesso (modo d'accesso, utente o kernel, spazio d'indirizzamento)</a:t>
+              <a:t>In ogni caso bisogna sempre controllare la validità dell'indirizzo a cui si tenta di fare accesso (modo d'accesso, utente o kernel, spazio d'indirizzamento).</a:t>
             </a:r>
             <a:endParaRPr lang="it-IT" dirty="0">
               <a:ea typeface="+mn-lt"/>
@@ -19676,7 +19647,7 @@
                 <a:ea typeface="+mn-lt"/>
                 <a:cs typeface="+mn-lt"/>
               </a:rPr>
-              <a:t> (ASID) che possono essere usati per mantenere entry di processi diversi da quello attuale. L'opzione d'invalidazione delle entry (il flush) resta più semplice da attuare</a:t>
+              <a:t> (ASID) che possono essere usati per mantenere entry di processi diversi da quello attuale. L'opzione d'invalidazione delle entry (il flush) resta più semplice da attuare.</a:t>
             </a:r>
             <a:endParaRPr lang="it-IT" dirty="0"/>
           </a:p>
@@ -19697,7 +19668,7 @@
               <a:t>: poiché il TLB è una risorsa condivisa, è necessario l'uso di meccanismi di sincronizzazione per la sua modifica. In OS161 di base ci si limita a disabilitare gli interrupts sulla </a:t>
             </a:r>
             <a:r>
-              <a:rPr lang="it-IT" sz="2400" err="1">
+              <a:rPr lang="it-IT" sz="2400" dirty="0" err="1">
                 <a:ea typeface="+mn-lt"/>
                 <a:cs typeface="+mn-lt"/>
               </a:rPr>
@@ -19711,7 +19682,7 @@
               <a:t> in cui sta venendo eseguita la </a:t>
             </a:r>
             <a:r>
-              <a:rPr lang="it-IT" sz="2400" err="1">
+              <a:rPr lang="it-IT" sz="2400" i="1" dirty="0" err="1">
                 <a:ea typeface="+mn-lt"/>
                 <a:cs typeface="+mn-lt"/>
               </a:rPr>
@@ -19861,7 +19832,7 @@
                 <a:ea typeface="+mn-lt"/>
                 <a:cs typeface="+mn-lt"/>
               </a:rPr>
-              <a:t>tenere traccia delle pagine di un processo</a:t>
+              <a:t>tenere traccia delle pagine di un processo;</a:t>
             </a:r>
             <a:endParaRPr lang="it-IT" sz="2200" dirty="0"/>
           </a:p>
@@ -19888,9 +19859,9 @@
                 <a:ea typeface="+mn-lt"/>
                 <a:cs typeface="+mn-lt"/>
               </a:rPr>
-              <a:t> stesso</a:t>
-            </a:r>
-            <a:endParaRPr lang="it-IT" sz="2200"/>
+              <a:t> stesso;</a:t>
+            </a:r>
+            <a:endParaRPr lang="it-IT" sz="2200" dirty="0"/>
           </a:p>
           <a:p>
             <a:pPr marL="781685" lvl="1" indent="-457200">
@@ -19915,9 +19886,9 @@
                 <a:ea typeface="+mn-lt"/>
                 <a:cs typeface="+mn-lt"/>
               </a:rPr>
-              <a:t> dei frame a tali pagine</a:t>
-            </a:r>
-            <a:endParaRPr lang="it-IT" sz="2200"/>
+              <a:t> dei frame a tali pagine.</a:t>
+            </a:r>
+            <a:endParaRPr lang="it-IT" sz="2200" dirty="0"/>
           </a:p>
         </p:txBody>
       </p:sp>
@@ -20544,7 +20515,7 @@
               <a:t>Questa è la rappresentazione di una PTE all'interno di </a:t>
             </a:r>
             <a:r>
-              <a:rPr lang="it-IT" sz="2400" err="1">
+              <a:rPr lang="it-IT" sz="2400" dirty="0" err="1">
                 <a:ea typeface="+mn-lt"/>
                 <a:cs typeface="+mn-lt"/>
               </a:rPr>
@@ -20565,7 +20536,7 @@
               <a:t> </a:t>
             </a:r>
             <a:r>
-              <a:rPr lang="it-IT" sz="2400" i="1" err="1">
+              <a:rPr lang="it-IT" sz="2400" i="1" dirty="0" err="1">
                 <a:ea typeface="+mn-lt"/>
                 <a:cs typeface="+mn-lt"/>
               </a:rPr>
@@ -20586,7 +20557,7 @@
               <a:t>copy on </a:t>
             </a:r>
             <a:r>
-              <a:rPr lang="it-IT" sz="2400" i="1" err="1">
+              <a:rPr lang="it-IT" sz="2400" i="1" dirty="0" err="1">
                 <a:ea typeface="+mn-lt"/>
                 <a:cs typeface="+mn-lt"/>
               </a:rPr>
@@ -20597,9 +20568,9 @@
                 <a:ea typeface="+mn-lt"/>
                 <a:cs typeface="+mn-lt"/>
               </a:rPr>
-              <a:t>)</a:t>
-            </a:r>
-            <a:endParaRPr lang="it-IT"/>
+              <a:t>).</a:t>
+            </a:r>
+            <a:endParaRPr lang="it-IT" dirty="0"/>
           </a:p>
         </p:txBody>
       </p:sp>
@@ -20868,7 +20839,7 @@
               <a:t>Ovviamente le strutture usate occupano a loro volta memoria. È quindi opportuno realizzare delle funzioni dedite alla loro istanziazione e </a:t>
             </a:r>
             <a:r>
-              <a:rPr lang="it-IT" sz="2400" err="1">
+              <a:rPr lang="it-IT" sz="2400" dirty="0" err="1">
                 <a:ea typeface="+mn-lt"/>
                 <a:cs typeface="+mn-lt"/>
               </a:rPr>
@@ -20882,7 +20853,7 @@
               <a:t>. Tali funzioni verrebbero poi invocate al momento della creazione/distruzione dello spazio d'indirizzamento del processo, ad esempio dentro </a:t>
             </a:r>
             <a:r>
-              <a:rPr lang="it-IT" sz="2400" i="1" err="1">
+              <a:rPr lang="it-IT" sz="2400" i="1" dirty="0" err="1">
                 <a:ea typeface="+mn-lt"/>
                 <a:cs typeface="+mn-lt"/>
               </a:rPr>
@@ -20896,13 +20867,20 @@
               <a:t> e </a:t>
             </a:r>
             <a:r>
-              <a:rPr lang="it-IT" sz="2400" i="1" err="1">
+              <a:rPr lang="it-IT" sz="2400" i="1" dirty="0" err="1">
                 <a:ea typeface="+mn-lt"/>
                 <a:cs typeface="+mn-lt"/>
               </a:rPr>
               <a:t>as_destroy</a:t>
             </a:r>
-            <a:endParaRPr lang="it-IT" i="1" err="1"/>
+            <a:r>
+              <a:rPr lang="it-IT" sz="2400" i="1" dirty="0">
+                <a:ea typeface="+mn-lt"/>
+                <a:cs typeface="+mn-lt"/>
+              </a:rPr>
+              <a:t>.</a:t>
+            </a:r>
+            <a:endParaRPr lang="it-IT" i="1" dirty="0"/>
           </a:p>
         </p:txBody>
       </p:sp>
@@ -21308,7 +21286,7 @@
                 <a:ea typeface="+mn-lt"/>
                 <a:cs typeface="+mn-lt"/>
               </a:rPr>
-              <a:t>) ma non richiedendo memoria pari a quella richiesta dallo spazio d'indirizzamento.</a:t>
+              <a:t>), ma non richiedendo memoria pari a quella richiesta dallo spazio d'indirizzamento.</a:t>
             </a:r>
             <a:endParaRPr lang="it-IT" dirty="0">
               <a:ea typeface="+mn-lt"/>
@@ -21357,7 +21335,7 @@
                 <a:ea typeface="+mn-lt"/>
                 <a:cs typeface="+mn-lt"/>
               </a:rPr>
-              <a:t>, in cui al momento della creazione di un processo si alloca lo stretto indispensabile, e si caricano le pagine in memoria solo quando vengono richieste</a:t>
+              <a:t>, in cui al momento della creazione di un processo si alloca lo stretto indispensabile, e si caricano le pagine in memoria solo quando vengono richieste.</a:t>
             </a:r>
             <a:endParaRPr lang="it-IT" dirty="0"/>
           </a:p>
@@ -21620,34 +21598,6 @@
           </a:lstStyle>
           <a:p>
             <a:pPr marL="305435" indent="-305435"/>
-            <a:endParaRPr lang="it-IT">
-              <a:ea typeface="+mn-lt"/>
-              <a:cs typeface="+mn-lt"/>
-            </a:endParaRPr>
-          </a:p>
-          <a:p>
-            <a:pPr marL="305435" indent="-305435"/>
-            <a:r>
-              <a:rPr lang="it-IT" sz="2400" dirty="0">
-                <a:ea typeface="+mn-lt"/>
-                <a:cs typeface="+mn-lt"/>
-              </a:rPr>
-              <a:t>Bisognerà poi realizzare una funzione in grado di gestire i page fault, ovvero che si occupi di recuperare le pagine dal disco, allocare lo spazio necessario in </a:t>
-            </a:r>
-            <a:r>
-              <a:rPr lang="it-IT" sz="2400" dirty="0" err="1">
-                <a:ea typeface="+mn-lt"/>
-                <a:cs typeface="+mn-lt"/>
-              </a:rPr>
-              <a:t>ram</a:t>
-            </a:r>
-            <a:r>
-              <a:rPr lang="it-IT" sz="2400" dirty="0">
-                <a:ea typeface="+mn-lt"/>
-                <a:cs typeface="+mn-lt"/>
-              </a:rPr>
-              <a:t> (eventualmente rimuovendo pagine già trovate) e far ripartire il processo.</a:t>
-            </a:r>
             <a:endParaRPr lang="it-IT" dirty="0">
               <a:ea typeface="+mn-lt"/>
               <a:cs typeface="+mn-lt"/>
@@ -21660,10 +21610,38 @@
                 <a:ea typeface="+mn-lt"/>
                 <a:cs typeface="+mn-lt"/>
               </a:rPr>
+              <a:t>Bisognerà poi realizzare una funzione in grado di gestire i page fault, ovvero che si occupi di recuperare le pagine dal disco, allocare lo spazio necessario in </a:t>
+            </a:r>
+            <a:r>
+              <a:rPr lang="it-IT" sz="2400" dirty="0" err="1">
+                <a:ea typeface="+mn-lt"/>
+                <a:cs typeface="+mn-lt"/>
+              </a:rPr>
+              <a:t>ram</a:t>
+            </a:r>
+            <a:r>
+              <a:rPr lang="it-IT" sz="2400" dirty="0">
+                <a:ea typeface="+mn-lt"/>
+                <a:cs typeface="+mn-lt"/>
+              </a:rPr>
+              <a:t> (eventualmente rimuovendo pagine già trovate) e far ripartire il processo.</a:t>
+            </a:r>
+            <a:endParaRPr lang="it-IT" dirty="0">
+              <a:ea typeface="+mn-lt"/>
+              <a:cs typeface="+mn-lt"/>
+            </a:endParaRPr>
+          </a:p>
+          <a:p>
+            <a:pPr marL="305435" indent="-305435"/>
+            <a:r>
+              <a:rPr lang="it-IT" sz="2400" dirty="0">
+                <a:ea typeface="+mn-lt"/>
+                <a:cs typeface="+mn-lt"/>
+              </a:rPr>
               <a:t>In </a:t>
             </a:r>
             <a:r>
-              <a:rPr lang="it-IT" sz="2400" err="1">
+              <a:rPr lang="it-IT" sz="2400" dirty="0" err="1">
                 <a:ea typeface="+mn-lt"/>
                 <a:cs typeface="+mn-lt"/>
               </a:rPr>
@@ -21677,7 +21655,7 @@
               <a:t> questi compiti sono svolti dalla </a:t>
             </a:r>
             <a:r>
-              <a:rPr lang="it-IT" sz="2400" i="1" err="1">
+              <a:rPr lang="it-IT" sz="2400" i="1" dirty="0" err="1">
                 <a:ea typeface="+mn-lt"/>
                 <a:cs typeface="+mn-lt"/>
               </a:rPr>
@@ -21691,7 +21669,7 @@
               <a:t> (in </a:t>
             </a:r>
             <a:r>
-              <a:rPr lang="it-IT" sz="2400" i="1" err="1">
+              <a:rPr lang="it-IT" sz="2400" i="1" dirty="0" err="1">
                 <a:ea typeface="+mn-lt"/>
                 <a:cs typeface="+mn-lt"/>
               </a:rPr>
@@ -21705,7 +21683,7 @@
               <a:t>/</a:t>
             </a:r>
             <a:r>
-              <a:rPr lang="it-IT" sz="2400" i="1" err="1">
+              <a:rPr lang="it-IT" sz="2400" i="1" dirty="0" err="1">
                 <a:ea typeface="+mn-lt"/>
                 <a:cs typeface="+mn-lt"/>
               </a:rPr>
@@ -21719,7 +21697,7 @@
               <a:t>/</a:t>
             </a:r>
             <a:r>
-              <a:rPr lang="it-IT" sz="2400" i="1" err="1">
+              <a:rPr lang="it-IT" sz="2400" i="1" dirty="0" err="1">
                 <a:ea typeface="+mn-lt"/>
                 <a:cs typeface="+mn-lt"/>
               </a:rPr>
@@ -21733,7 +21711,7 @@
               <a:t>). In OS161 si potrebbe pensare di realizzare una funzione omonima in </a:t>
             </a:r>
             <a:r>
-              <a:rPr lang="it-IT" sz="2400" i="1" err="1">
+              <a:rPr lang="it-IT" sz="2400" i="1" dirty="0" err="1">
                 <a:ea typeface="+mn-lt"/>
                 <a:cs typeface="+mn-lt"/>
               </a:rPr>
@@ -21754,7 +21732,7 @@
               <a:t> </a:t>
             </a:r>
             <a:r>
-              <a:rPr lang="it-IT" sz="2400" i="1" err="1">
+              <a:rPr lang="it-IT" sz="2400" i="1" dirty="0" err="1">
                 <a:ea typeface="+mn-lt"/>
                 <a:cs typeface="+mn-lt"/>
               </a:rPr>
@@ -21768,7 +21746,7 @@
               <a:t> rilevi la mancanza della pagina cercata anche in memoria principale. In questo caso la </a:t>
             </a:r>
             <a:r>
-              <a:rPr lang="it-IT" sz="2400" err="1">
+              <a:rPr lang="it-IT" sz="2400" dirty="0" err="1">
                 <a:ea typeface="+mn-lt"/>
                 <a:cs typeface="+mn-lt"/>
               </a:rPr>
@@ -21781,7 +21759,7 @@
               </a:rPr>
               <a:t> dovrebbe solo occuparsi di gestire l'allocazione della nuova pagina.</a:t>
             </a:r>
-            <a:endParaRPr lang="it-IT"/>
+            <a:endParaRPr lang="it-IT" dirty="0"/>
           </a:p>
         </p:txBody>
       </p:sp>
@@ -22396,7 +22374,7 @@
               <a:t>Implementare una funzione apposita per invalidare (settando a 0 il </a:t>
             </a:r>
             <a:r>
-              <a:rPr lang="it-IT" sz="2200" err="1">
+              <a:rPr lang="it-IT" sz="2200" dirty="0" err="1">
                 <a:ea typeface="+mn-lt"/>
                 <a:cs typeface="+mn-lt"/>
               </a:rPr>
@@ -22407,9 +22385,9 @@
                 <a:ea typeface="+mn-lt"/>
                 <a:cs typeface="+mn-lt"/>
               </a:rPr>
-              <a:t> bit sito nei 32 bit più bassi della TLB entry) l'entry nel TLB della pagina rimossa (se esiste)</a:t>
-            </a:r>
-            <a:endParaRPr lang="it-IT" sz="2200"/>
+              <a:t> bit sito nei 32 bit più bassi della TLB entry) l'entry nel TLB della pagina rimossa (se esiste);</a:t>
+            </a:r>
+            <a:endParaRPr lang="it-IT" sz="2200" dirty="0"/>
           </a:p>
           <a:p>
             <a:pPr marL="629920" lvl="1" indent="-305435"/>
@@ -22432,7 +22410,7 @@
                 <a:ea typeface="+mn-lt"/>
                 <a:cs typeface="+mn-lt"/>
               </a:rPr>
-              <a:t> l'identificativo della pagina rimossa così da inserire direttamente al suo posto nel TLB (se c'era) la nuova pagina </a:t>
+              <a:t> l'identificativo della pagina rimossa così da inserire direttamente al suo posto nel TLB (se c'era) la nuova pagina.</a:t>
             </a:r>
           </a:p>
           <a:p>
@@ -22449,7 +22427,7 @@
                 <a:ea typeface="+mn-lt"/>
                 <a:cs typeface="+mn-lt"/>
               </a:rPr>
-              <a:t>tlb_write</a:t>
+              <a:t>TLB_write</a:t>
             </a:r>
             <a:r>
               <a:rPr lang="it-IT" sz="2400" dirty="0">
@@ -22463,16 +22441,16 @@
                 <a:ea typeface="+mn-lt"/>
                 <a:cs typeface="+mn-lt"/>
               </a:rPr>
-              <a:t>tlb_probe</a:t>
-            </a:r>
-            <a:r>
-              <a:rPr lang="it-IT" sz="2400" dirty="0">
-                <a:ea typeface="+mn-lt"/>
-                <a:cs typeface="+mn-lt"/>
-              </a:rPr>
-              <a:t> per la realizzazione </a:t>
-            </a:r>
-            <a:endParaRPr lang="it-IT"/>
+              <a:t>TLB_probe</a:t>
+            </a:r>
+            <a:r>
+              <a:rPr lang="it-IT" sz="2400" dirty="0">
+                <a:ea typeface="+mn-lt"/>
+                <a:cs typeface="+mn-lt"/>
+              </a:rPr>
+              <a:t> per la realizzazione. </a:t>
+            </a:r>
+            <a:endParaRPr lang="it-IT" dirty="0"/>
           </a:p>
         </p:txBody>
       </p:sp>
@@ -22768,7 +22746,7 @@
               </a:rPr>
               <a:t> entry. </a:t>
             </a:r>
-            <a:endParaRPr lang="it-IT"/>
+            <a:endParaRPr lang="it-IT" dirty="0"/>
           </a:p>
           <a:p>
             <a:pPr marL="305435" indent="-305435"/>
@@ -22903,9 +22881,9 @@
                 <a:ea typeface="+mn-lt"/>
                 <a:cs typeface="+mn-lt"/>
               </a:rPr>
-              <a:t>) </a:t>
-            </a:r>
-            <a:endParaRPr lang="it-IT"/>
+              <a:t>).</a:t>
+            </a:r>
+            <a:endParaRPr lang="it-IT" dirty="0"/>
           </a:p>
         </p:txBody>
       </p:sp>
@@ -23060,6 +23038,13 @@
             <a:schemeClr val="lt1"/>
           </a:fontRef>
         </p:style>
+        <p:txBody>
+          <a:bodyPr/>
+          <a:lstStyle/>
+          <a:p>
+            <a:endParaRPr lang="it-IT"/>
+          </a:p>
+        </p:txBody>
       </p:sp>
       <p:sp>
         <p:nvSpPr>
@@ -23182,6 +23167,13 @@
               <a:schemeClr val="lt1"/>
             </a:fontRef>
           </p:style>
+          <p:txBody>
+            <a:bodyPr/>
+            <a:lstStyle/>
+            <a:p>
+              <a:endParaRPr lang="it-IT"/>
+            </a:p>
+          </p:txBody>
         </p:sp>
         <p:sp>
           <p:nvSpPr>
@@ -23234,6 +23226,13 @@
               <a:schemeClr val="lt1"/>
             </a:fontRef>
           </p:style>
+          <p:txBody>
+            <a:bodyPr/>
+            <a:lstStyle/>
+            <a:p>
+              <a:endParaRPr lang="it-IT"/>
+            </a:p>
+          </p:txBody>
         </p:sp>
         <p:sp>
           <p:nvSpPr>
@@ -23286,6 +23285,13 @@
               <a:schemeClr val="lt1"/>
             </a:fontRef>
           </p:style>
+          <p:txBody>
+            <a:bodyPr/>
+            <a:lstStyle/>
+            <a:p>
+              <a:endParaRPr lang="it-IT"/>
+            </a:p>
+          </p:txBody>
         </p:sp>
       </p:grpSp>
       <p:graphicFrame>
@@ -23866,9 +23872,24 @@
                 <a:ea typeface="+mn-lt"/>
                 <a:cs typeface="+mn-lt"/>
               </a:rPr>
-              <a:t> è di 4GB (2^32 bits). </a:t>
-            </a:r>
-            <a:endParaRPr lang="it-IT" sz="2400"/>
+              <a:t> è di 4GB (</a:t>
+            </a:r>
+            <a:r>
+              <a:rPr lang="it-IT" sz="2400" dirty="0"/>
+              <a:t>2</a:t>
+            </a:r>
+            <a:r>
+              <a:rPr lang="it-IT" sz="2400" baseline="30000" dirty="0"/>
+              <a:t>32</a:t>
+            </a:r>
+            <a:r>
+              <a:rPr lang="it-IT" sz="2400" dirty="0">
+                <a:ea typeface="+mn-lt"/>
+                <a:cs typeface="+mn-lt"/>
+              </a:rPr>
+              <a:t> bits). </a:t>
+            </a:r>
+            <a:endParaRPr lang="it-IT" sz="2400" dirty="0"/>
           </a:p>
           <a:p>
             <a:pPr marL="305435" indent="-305435"/>
@@ -23885,11 +23906,19 @@
               <a:buNone/>
             </a:pPr>
             <a:r>
-              <a:rPr lang="it-IT" sz="2400" dirty="0">
-                <a:ea typeface="+mn-lt"/>
-                <a:cs typeface="+mn-lt"/>
-              </a:rPr>
-              <a:t>2^20 = 2M frames.</a:t>
+              <a:rPr lang="it-IT" sz="2400" dirty="0"/>
+              <a:t>2</a:t>
+            </a:r>
+            <a:r>
+              <a:rPr lang="it-IT" sz="2400" baseline="30000" dirty="0"/>
+              <a:t>20</a:t>
+            </a:r>
+            <a:r>
+              <a:rPr lang="it-IT" sz="2400" dirty="0">
+                <a:ea typeface="+mn-lt"/>
+                <a:cs typeface="+mn-lt"/>
+              </a:rPr>
+              <a:t> = 2M frames.</a:t>
             </a:r>
             <a:endParaRPr lang="it-IT" sz="2400" dirty="0"/>
           </a:p>
@@ -23990,7 +24019,7 @@
               </a:rPr>
               <a:t>Il sistema operativo alloca la memoria disponibile in multipli di frame. </a:t>
             </a:r>
-            <a:endParaRPr lang="it-IT" sz="2400"/>
+            <a:endParaRPr lang="it-IT" sz="2400" dirty="0"/>
           </a:p>
           <a:p>
             <a:pPr marL="305435" indent="-305435"/>
@@ -24010,9 +24039,9 @@
                 <a:ea typeface="+mn-lt"/>
                 <a:cs typeface="+mn-lt"/>
               </a:rPr>
-              <a:t>Se esso è libero o occupato</a:t>
-            </a:r>
-            <a:endParaRPr lang="it-IT" sz="2200"/>
+              <a:t>Se esso è libero o occupato;</a:t>
+            </a:r>
+            <a:endParaRPr lang="it-IT" sz="2200" dirty="0"/>
           </a:p>
           <a:p>
             <a:pPr marL="629920" lvl="1" indent="-305435"/>
@@ -24021,9 +24050,9 @@
                 <a:ea typeface="+mn-lt"/>
                 <a:cs typeface="+mn-lt"/>
               </a:rPr>
-              <a:t>Se contiene codice/strutture dati del kernel</a:t>
-            </a:r>
-            <a:endParaRPr lang="it-IT" sz="2200"/>
+              <a:t>Se contiene codice/strutture dati del kernel;</a:t>
+            </a:r>
+            <a:endParaRPr lang="it-IT" sz="2200" dirty="0"/>
           </a:p>
           <a:p>
             <a:pPr marL="629920" lvl="1" indent="-305435"/>
@@ -24032,9 +24061,9 @@
                 <a:ea typeface="+mn-lt"/>
                 <a:cs typeface="+mn-lt"/>
               </a:rPr>
-              <a:t>Se appartiene o meno ad un processo utente</a:t>
-            </a:r>
-            <a:endParaRPr lang="it-IT" sz="2200"/>
+              <a:t>Se appartiene o meno ad un processo utente.</a:t>
+            </a:r>
+            <a:endParaRPr lang="it-IT" sz="2200" dirty="0"/>
           </a:p>
         </p:txBody>
       </p:sp>
@@ -24294,18 +24323,20 @@
             </a:lvl9pPr>
           </a:lstStyle>
           <a:p>
-            <a:pPr marL="305435" indent="-305435"/>
-            <a:r>
-              <a:rPr lang="it-IT" sz="2400" dirty="0">
-                <a:ea typeface="+mn-lt"/>
-                <a:cs typeface="+mn-lt"/>
-              </a:rPr>
-              <a:t>Al contrario di quanto avviene in OS161, che nella versione base contiene un gestore di memoria che effettua unicamente allocazione contigua di memoria reale, senza mai rilasciarla, e quindi non tiene traccia dei frame assegnati (se non come “ultimo indirizzo assegnato”), </a:t>
-            </a:r>
-            <a:endParaRPr lang="it-IT" sz="2400"/>
-          </a:p>
-          <a:p>
-            <a:pPr marL="305435" indent="-305435"/>
+            <a:pPr marL="0" indent="0">
+              <a:buNone/>
+            </a:pPr>
+            <a:r>
+              <a:rPr lang="it-IT" sz="2400" dirty="0">
+                <a:ea typeface="+mn-lt"/>
+                <a:cs typeface="+mn-lt"/>
+              </a:rPr>
+              <a:t>Al contrario di quanto avviene in OS161, che nella versione base contiene un gestore di memoria che effettua unicamente allocazione contigua di memoria reale, senza mai rilasciarla, e quindi non tiene traccia dei frame assegnati (se non come “ultimo indirizzo assegnato”),</a:t>
+            </a:r>
+            <a:r>
+              <a:rPr lang="it-IT" sz="2400" dirty="0"/>
+              <a:t> </a:t>
+            </a:r>
             <a:r>
               <a:rPr lang="it-IT" sz="2400" dirty="0">
                 <a:ea typeface="+mn-lt"/>
@@ -24388,7 +24419,7 @@
                 <a:ea typeface="+mn-lt"/>
                 <a:cs typeface="+mn-lt"/>
               </a:rPr>
-              <a:t>)</a:t>
+              <a:t>).</a:t>
             </a:r>
             <a:endParaRPr lang="it-IT" dirty="0"/>
           </a:p>

</xml_diff>